<commit_message>
Minor update of slides for Termin_3.
</commit_message>
<xml_diff>
--- a/Termin_3/folien/UebungModellierung#3.pptx
+++ b/Termin_3/folien/UebungModellierung#3.pptx
@@ -406,7 +406,7 @@
     </p:spTree>
     <p:extLst>
       <p:ext uri="{BB962C8B-B14F-4D97-AF65-F5344CB8AC3E}">
-        <p14:creationId xmlns:p14="http://schemas.microsoft.com/office/powerpoint/2010/main" xmlns="" val="1882660213"/>
+        <p14:creationId xmlns="" xmlns:p14="http://schemas.microsoft.com/office/powerpoint/2010/main" val="1882660213"/>
       </p:ext>
     </p:extLst>
   </p:cSld>
@@ -745,7 +745,7 @@
     </p:spTree>
     <p:extLst>
       <p:ext uri="{BB962C8B-B14F-4D97-AF65-F5344CB8AC3E}">
-        <p14:creationId xmlns:p14="http://schemas.microsoft.com/office/powerpoint/2010/main" xmlns="" val="2781074432"/>
+        <p14:creationId xmlns="" xmlns:p14="http://schemas.microsoft.com/office/powerpoint/2010/main" val="2781074432"/>
       </p:ext>
     </p:extLst>
   </p:cSld>
@@ -4829,7 +4829,37 @@
                 <a:latin typeface="Calibri" pitchFamily="34" charset="0"/>
                 <a:cs typeface="+mn-cs"/>
               </a:rPr>
-              <a:t>Übung zur Einführung in die Modellierung, Wintersemester 2016/17                 #</a:t>
+              <a:t>Seminar „Einführung </a:t>
+            </a:r>
+            <a:r>
+              <a:rPr lang="de-DE" noProof="0" dirty="0" smtClean="0">
+                <a:solidFill>
+                  <a:schemeClr val="bg1"/>
+                </a:solidFill>
+                <a:latin typeface="Calibri" pitchFamily="34" charset="0"/>
+                <a:cs typeface="+mn-cs"/>
+              </a:rPr>
+              <a:t>in die </a:t>
+            </a:r>
+            <a:r>
+              <a:rPr lang="de-DE" noProof="0" dirty="0" smtClean="0">
+                <a:solidFill>
+                  <a:schemeClr val="bg1"/>
+                </a:solidFill>
+                <a:latin typeface="Calibri" pitchFamily="34" charset="0"/>
+                <a:cs typeface="+mn-cs"/>
+              </a:rPr>
+              <a:t>Modellierung“, </a:t>
+            </a:r>
+            <a:r>
+              <a:rPr lang="de-DE" noProof="0" dirty="0" smtClean="0">
+                <a:solidFill>
+                  <a:schemeClr val="bg1"/>
+                </a:solidFill>
+                <a:latin typeface="Calibri" pitchFamily="34" charset="0"/>
+                <a:cs typeface="+mn-cs"/>
+              </a:rPr>
+              <a:t>Wintersemester 2016/17                 #</a:t>
             </a:r>
             <a:fld id="{19621714-58BB-457A-826B-841F6E217726}" type="slidenum">
               <a:rPr lang="de-DE" noProof="0" smtClean="0">
@@ -5600,36 +5630,36 @@
                 <a:rPr lang="de-DE" sz="2000" dirty="0" smtClean="0">
                   <a:latin typeface="Calibri" pitchFamily="34" charset="0"/>
                 </a:rPr>
-                <a:t>Übung im </a:t>
+                <a:t>Seminar </a:t>
               </a:r>
               <a:r>
-                <a:rPr lang="de-DE" sz="2000" smtClean="0">
+                <a:rPr lang="de-DE" sz="2000" i="1" dirty="0" smtClean="0">
                   <a:latin typeface="Calibri" pitchFamily="34" charset="0"/>
                 </a:rPr>
-                <a:t>Modul </a:t>
-              </a:r>
-              <a:br>
-                <a:rPr lang="de-DE" sz="2000" smtClean="0">
-                  <a:latin typeface="Calibri" pitchFamily="34" charset="0"/>
-                </a:rPr>
-              </a:br>
-              <a:r>
-                <a:rPr lang="de-DE" sz="2000" smtClean="0">
-                  <a:latin typeface="Calibri" pitchFamily="34" charset="0"/>
-                </a:rPr>
-                <a:t>Versuchsplanung </a:t>
+                <a:t>Einführung in die Modellierung</a:t>
               </a:r>
               <a:r>
                 <a:rPr lang="de-DE" sz="2000" dirty="0" smtClean="0">
                   <a:latin typeface="Calibri" pitchFamily="34" charset="0"/>
                 </a:rPr>
-                <a:t>und </a:t>
+                <a:t/>
+              </a:r>
+              <a:br>
+                <a:rPr lang="de-DE" sz="2000" dirty="0" smtClean="0">
+                  <a:latin typeface="Calibri" pitchFamily="34" charset="0"/>
+                </a:rPr>
+              </a:br>
+              <a:r>
+                <a:rPr lang="de-DE" sz="2000" dirty="0" smtClean="0">
+                  <a:latin typeface="Calibri" pitchFamily="34" charset="0"/>
+                </a:rPr>
+                <a:t>im Modul </a:t>
               </a:r>
               <a:r>
-                <a:rPr lang="de-DE" sz="2000" smtClean="0">
+                <a:rPr lang="de-DE" sz="2000" i="1" dirty="0" smtClean="0">
                   <a:latin typeface="Calibri" pitchFamily="34" charset="0"/>
                 </a:rPr>
-                <a:t>Geoökologische Modellierung</a:t>
+                <a:t>Versuchsplanung und Geoökologische Modellierung</a:t>
               </a:r>
               <a:endParaRPr lang="de-DE" sz="2000" dirty="0" smtClean="0">
                 <a:latin typeface="Calibri" pitchFamily="34" charset="0"/>
@@ -5812,18 +5842,7 @@
                 </a:solidFill>
                 <a:latin typeface="Calibri" pitchFamily="34" charset="0"/>
               </a:rPr>
-              <a:t>Das </a:t>
-            </a:r>
-            <a:r>
-              <a:rPr lang="de-DE" sz="2800" dirty="0" smtClean="0">
-                <a:solidFill>
-                  <a:schemeClr val="bg1">
-                    <a:lumMod val="85000"/>
-                  </a:schemeClr>
-                </a:solidFill>
-                <a:latin typeface="Calibri" pitchFamily="34" charset="0"/>
-              </a:rPr>
-              <a:t>abcd-Modell</a:t>
+              <a:t>Das abcd-Modell</a:t>
             </a:r>
           </a:p>
         </p:txBody>
@@ -6420,13 +6439,7 @@
                 <a:rPr lang="de-DE" dirty="0" smtClean="0">
                   <a:latin typeface="Calibri" pitchFamily="34" charset="0"/>
                 </a:rPr>
-                <a:t>Direktabfluss </a:t>
-              </a:r>
-              <a:r>
-                <a:rPr lang="de-DE" dirty="0" smtClean="0">
-                  <a:latin typeface="Calibri" pitchFamily="34" charset="0"/>
-                </a:rPr>
-                <a:t>QD </a:t>
+                <a:t>Direktabfluss QD </a:t>
               </a:r>
               <a:endParaRPr lang="de-DE" dirty="0">
                 <a:latin typeface="Calibri" pitchFamily="34" charset="0"/>
@@ -6693,13 +6706,7 @@
                 <a:rPr lang="de-DE" dirty="0" smtClean="0">
                   <a:latin typeface="Calibri" pitchFamily="34" charset="0"/>
                 </a:rPr>
-                <a:t>Basisabfluss </a:t>
-              </a:r>
-              <a:r>
-                <a:rPr lang="de-DE" dirty="0" smtClean="0">
-                  <a:latin typeface="Calibri" pitchFamily="34" charset="0"/>
-                </a:rPr>
-                <a:t>QB </a:t>
+                <a:t>Basisabfluss QB </a:t>
               </a:r>
               <a:endParaRPr lang="de-DE" dirty="0">
                 <a:latin typeface="Calibri" pitchFamily="34" charset="0"/>
@@ -6785,9 +6792,6 @@
               </a:rPr>
               <a:t>Verdunstung und Bodenspeicher sind beschränkt! </a:t>
             </a:r>
-            <a:endParaRPr lang="de-DE" sz="1800" b="1" dirty="0" smtClean="0">
-              <a:latin typeface="Calibri" pitchFamily="34" charset="0"/>
-            </a:endParaRPr>
           </a:p>
         </p:txBody>
       </p:sp>
@@ -6934,13 +6938,7 @@
               <a:rPr lang="de-DE" sz="1800" dirty="0" smtClean="0">
                 <a:latin typeface="Calibri" pitchFamily="34" charset="0"/>
               </a:rPr>
-              <a:t>die </a:t>
-            </a:r>
-            <a:r>
-              <a:rPr lang="de-DE" sz="1800" dirty="0" smtClean="0">
-                <a:latin typeface="Calibri" pitchFamily="34" charset="0"/>
-              </a:rPr>
-              <a:t>Auffüllung des Bodens auf </a:t>
+              <a:t>die Auffüllung des Bodens auf </a:t>
             </a:r>
             <a:r>
               <a:rPr lang="de-DE" sz="1800" dirty="0" smtClean="0">
@@ -7804,18 +7802,7 @@
                 </a:solidFill>
                 <a:latin typeface="Calibri" pitchFamily="34" charset="0"/>
               </a:rPr>
-              <a:t>Das </a:t>
-            </a:r>
-            <a:r>
-              <a:rPr lang="de-DE" sz="2800" dirty="0" smtClean="0">
-                <a:solidFill>
-                  <a:schemeClr val="bg1">
-                    <a:lumMod val="85000"/>
-                  </a:schemeClr>
-                </a:solidFill>
-                <a:latin typeface="Calibri" pitchFamily="34" charset="0"/>
-              </a:rPr>
-              <a:t>abcd-Modell</a:t>
+              <a:t>Das abcd-Modell</a:t>
             </a:r>
           </a:p>
         </p:txBody>
@@ -8412,13 +8399,7 @@
                 <a:rPr lang="de-DE" dirty="0" smtClean="0">
                   <a:latin typeface="Calibri" pitchFamily="34" charset="0"/>
                 </a:rPr>
-                <a:t>Direktabfluss </a:t>
-              </a:r>
-              <a:r>
-                <a:rPr lang="de-DE" dirty="0" smtClean="0">
-                  <a:latin typeface="Calibri" pitchFamily="34" charset="0"/>
-                </a:rPr>
-                <a:t>QD </a:t>
+                <a:t>Direktabfluss QD </a:t>
               </a:r>
               <a:endParaRPr lang="de-DE" dirty="0">
                 <a:latin typeface="Calibri" pitchFamily="34" charset="0"/>
@@ -8685,13 +8666,7 @@
                 <a:rPr lang="de-DE" dirty="0" smtClean="0">
                   <a:latin typeface="Calibri" pitchFamily="34" charset="0"/>
                 </a:rPr>
-                <a:t>Basisabfluss </a:t>
-              </a:r>
-              <a:r>
-                <a:rPr lang="de-DE" dirty="0" smtClean="0">
-                  <a:latin typeface="Calibri" pitchFamily="34" charset="0"/>
-                </a:rPr>
-                <a:t>QB </a:t>
+                <a:t>Basisabfluss QB </a:t>
               </a:r>
               <a:endParaRPr lang="de-DE" dirty="0">
                 <a:latin typeface="Calibri" pitchFamily="34" charset="0"/>
@@ -8884,13 +8859,7 @@
               <a:rPr lang="de-DE" sz="1800" dirty="0" smtClean="0">
                 <a:latin typeface="Calibri" pitchFamily="34" charset="0"/>
               </a:rPr>
-              <a:t>die </a:t>
-            </a:r>
-            <a:r>
-              <a:rPr lang="de-DE" sz="1800" dirty="0" smtClean="0">
-                <a:latin typeface="Calibri" pitchFamily="34" charset="0"/>
-              </a:rPr>
-              <a:t>Auffüllung des Bodens auf </a:t>
+              <a:t>die Auffüllung des Bodens auf </a:t>
             </a:r>
             <a:r>
               <a:rPr lang="de-DE" sz="1800" dirty="0" smtClean="0">
@@ -9932,9 +9901,6 @@
               </a:rPr>
               <a:t>Verdunstung und Bodenspeicher sind beschränkt! </a:t>
             </a:r>
-            <a:endParaRPr lang="de-DE" sz="1800" b="1" dirty="0" smtClean="0">
-              <a:latin typeface="Calibri" pitchFamily="34" charset="0"/>
-            </a:endParaRPr>
           </a:p>
         </p:txBody>
       </p:sp>
@@ -10583,18 +10549,7 @@
                 </a:solidFill>
                 <a:latin typeface="Calibri" pitchFamily="34" charset="0"/>
               </a:rPr>
-              <a:t>Das </a:t>
-            </a:r>
-            <a:r>
-              <a:rPr lang="de-DE" sz="2800" dirty="0" smtClean="0">
-                <a:solidFill>
-                  <a:schemeClr val="bg1">
-                    <a:lumMod val="85000"/>
-                  </a:schemeClr>
-                </a:solidFill>
-                <a:latin typeface="Calibri" pitchFamily="34" charset="0"/>
-              </a:rPr>
-              <a:t>abcd-Modell</a:t>
+              <a:t>Das abcd-Modell</a:t>
             </a:r>
           </a:p>
         </p:txBody>
@@ -11191,13 +11146,7 @@
                 <a:rPr lang="de-DE" dirty="0" smtClean="0">
                   <a:latin typeface="Calibri" pitchFamily="34" charset="0"/>
                 </a:rPr>
-                <a:t>Direktabfluss </a:t>
-              </a:r>
-              <a:r>
-                <a:rPr lang="de-DE" dirty="0" smtClean="0">
-                  <a:latin typeface="Calibri" pitchFamily="34" charset="0"/>
-                </a:rPr>
-                <a:t>QD </a:t>
+                <a:t>Direktabfluss QD </a:t>
               </a:r>
               <a:endParaRPr lang="de-DE" dirty="0">
                 <a:latin typeface="Calibri" pitchFamily="34" charset="0"/>
@@ -11464,13 +11413,7 @@
                 <a:rPr lang="de-DE" dirty="0" smtClean="0">
                   <a:latin typeface="Calibri" pitchFamily="34" charset="0"/>
                 </a:rPr>
-                <a:t>Basisabfluss </a:t>
-              </a:r>
-              <a:r>
-                <a:rPr lang="de-DE" dirty="0" smtClean="0">
-                  <a:latin typeface="Calibri" pitchFamily="34" charset="0"/>
-                </a:rPr>
-                <a:t>QB </a:t>
+                <a:t>Basisabfluss QB </a:t>
               </a:r>
               <a:endParaRPr lang="de-DE" dirty="0">
                 <a:latin typeface="Calibri" pitchFamily="34" charset="0"/>
@@ -11663,13 +11606,7 @@
               <a:rPr lang="de-DE" sz="1800" dirty="0" smtClean="0">
                 <a:latin typeface="Calibri" pitchFamily="34" charset="0"/>
               </a:rPr>
-              <a:t>die </a:t>
-            </a:r>
-            <a:r>
-              <a:rPr lang="de-DE" sz="1800" dirty="0" smtClean="0">
-                <a:latin typeface="Calibri" pitchFamily="34" charset="0"/>
-              </a:rPr>
-              <a:t>Auffüllung des Bodens auf </a:t>
+              <a:t>die Auffüllung des Bodens auf </a:t>
             </a:r>
             <a:r>
               <a:rPr lang="de-DE" sz="1800" dirty="0" smtClean="0">
@@ -12175,13 +12112,6 @@
               </a:rPr>
               <a:t>b</a:t>
             </a:r>
-            <a:endParaRPr lang="de-DE" sz="1800" dirty="0" smtClean="0">
-              <a:solidFill>
-                <a:srgbClr val="3366FF"/>
-              </a:solidFill>
-              <a:latin typeface="Courier New" pitchFamily="49" charset="0"/>
-              <a:cs typeface="Courier New" pitchFamily="49" charset="0"/>
-            </a:endParaRPr>
           </a:p>
         </p:txBody>
       </p:sp>
@@ -12358,18 +12288,7 @@
                 </a:solidFill>
                 <a:latin typeface="Calibri" pitchFamily="34" charset="0"/>
               </a:rPr>
-              <a:t>Was </a:t>
-            </a:r>
-            <a:r>
-              <a:rPr lang="de-DE" sz="1800" dirty="0" smtClean="0">
-                <a:solidFill>
-                  <a:schemeClr val="accent5">
-                    <a:lumMod val="50000"/>
-                  </a:schemeClr>
-                </a:solidFill>
-                <a:latin typeface="Calibri" pitchFamily="34" charset="0"/>
-              </a:rPr>
-              <a:t>passiert mit dem Überschuss </a:t>
+              <a:t>Was passiert mit dem Überschuss </a:t>
             </a:r>
             <a:r>
               <a:rPr lang="de-DE" sz="1800" dirty="0" smtClean="0">
@@ -12512,9 +12431,6 @@
               </a:rPr>
               <a:t>Verdunstung und Bodenspeicher sind beschränkt! </a:t>
             </a:r>
-            <a:endParaRPr lang="de-DE" sz="1800" b="1" dirty="0" smtClean="0">
-              <a:latin typeface="Calibri" pitchFamily="34" charset="0"/>
-            </a:endParaRPr>
           </a:p>
         </p:txBody>
       </p:sp>
@@ -12705,18 +12621,7 @@
                 </a:solidFill>
                 <a:latin typeface="Calibri" pitchFamily="34" charset="0"/>
               </a:rPr>
-              <a:t>Das </a:t>
-            </a:r>
-            <a:r>
-              <a:rPr lang="de-DE" sz="2800" dirty="0" smtClean="0">
-                <a:solidFill>
-                  <a:schemeClr val="bg1">
-                    <a:lumMod val="85000"/>
-                  </a:schemeClr>
-                </a:solidFill>
-                <a:latin typeface="Calibri" pitchFamily="34" charset="0"/>
-              </a:rPr>
-              <a:t>abcd-Modell</a:t>
+              <a:t>Das abcd-Modell</a:t>
             </a:r>
           </a:p>
         </p:txBody>
@@ -13313,13 +13218,7 @@
                 <a:rPr lang="de-DE" dirty="0" smtClean="0">
                   <a:latin typeface="Calibri" pitchFamily="34" charset="0"/>
                 </a:rPr>
-                <a:t>Direktabfluss </a:t>
-              </a:r>
-              <a:r>
-                <a:rPr lang="de-DE" dirty="0" smtClean="0">
-                  <a:latin typeface="Calibri" pitchFamily="34" charset="0"/>
-                </a:rPr>
-                <a:t>QD </a:t>
+                <a:t>Direktabfluss QD </a:t>
               </a:r>
               <a:endParaRPr lang="de-DE" dirty="0">
                 <a:latin typeface="Calibri" pitchFamily="34" charset="0"/>
@@ -13586,13 +13485,7 @@
                 <a:rPr lang="de-DE" dirty="0" smtClean="0">
                   <a:latin typeface="Calibri" pitchFamily="34" charset="0"/>
                 </a:rPr>
-                <a:t>Basisabfluss </a:t>
-              </a:r>
-              <a:r>
-                <a:rPr lang="de-DE" dirty="0" smtClean="0">
-                  <a:latin typeface="Calibri" pitchFamily="34" charset="0"/>
-                </a:rPr>
-                <a:t>QB </a:t>
+                <a:t>Basisabfluss QB </a:t>
               </a:r>
               <a:endParaRPr lang="de-DE" dirty="0">
                 <a:latin typeface="Calibri" pitchFamily="34" charset="0"/>
@@ -13785,13 +13678,7 @@
               <a:rPr lang="de-DE" sz="1800" dirty="0" smtClean="0">
                 <a:latin typeface="Calibri" pitchFamily="34" charset="0"/>
               </a:rPr>
-              <a:t>die </a:t>
-            </a:r>
-            <a:r>
-              <a:rPr lang="de-DE" sz="1800" dirty="0" smtClean="0">
-                <a:latin typeface="Calibri" pitchFamily="34" charset="0"/>
-              </a:rPr>
-              <a:t>Auffüllung des Bodens auf </a:t>
+              <a:t>die Auffüllung des Bodens auf </a:t>
             </a:r>
             <a:r>
               <a:rPr lang="de-DE" sz="1800" dirty="0" smtClean="0">
@@ -14297,13 +14184,6 @@
               </a:rPr>
               <a:t>b</a:t>
             </a:r>
-            <a:endParaRPr lang="de-DE" sz="1800" dirty="0" smtClean="0">
-              <a:solidFill>
-                <a:srgbClr val="3366FF"/>
-              </a:solidFill>
-              <a:latin typeface="Courier New" pitchFamily="49" charset="0"/>
-              <a:cs typeface="Courier New" pitchFamily="49" charset="0"/>
-            </a:endParaRPr>
           </a:p>
         </p:txBody>
       </p:sp>
@@ -14674,9 +14554,6 @@
               </a:rPr>
               <a:t>Verdunstung und Bodenspeicher sind beschränkt! </a:t>
             </a:r>
-            <a:endParaRPr lang="de-DE" sz="1800" b="1" dirty="0" smtClean="0">
-              <a:latin typeface="Calibri" pitchFamily="34" charset="0"/>
-            </a:endParaRPr>
           </a:p>
         </p:txBody>
       </p:sp>
@@ -15042,18 +14919,7 @@
                 </a:solidFill>
                 <a:latin typeface="Calibri" pitchFamily="34" charset="0"/>
               </a:rPr>
-              <a:t>Das </a:t>
-            </a:r>
-            <a:r>
-              <a:rPr lang="de-DE" sz="2800" dirty="0" smtClean="0">
-                <a:solidFill>
-                  <a:schemeClr val="bg1">
-                    <a:lumMod val="85000"/>
-                  </a:schemeClr>
-                </a:solidFill>
-                <a:latin typeface="Calibri" pitchFamily="34" charset="0"/>
-              </a:rPr>
-              <a:t>abcd-Modell</a:t>
+              <a:t>Das abcd-Modell</a:t>
             </a:r>
           </a:p>
         </p:txBody>
@@ -15650,13 +15516,7 @@
                 <a:rPr lang="de-DE" dirty="0" smtClean="0">
                   <a:latin typeface="Calibri" pitchFamily="34" charset="0"/>
                 </a:rPr>
-                <a:t>Direktabfluss </a:t>
-              </a:r>
-              <a:r>
-                <a:rPr lang="de-DE" dirty="0" smtClean="0">
-                  <a:latin typeface="Calibri" pitchFamily="34" charset="0"/>
-                </a:rPr>
-                <a:t>QD </a:t>
+                <a:t>Direktabfluss QD </a:t>
               </a:r>
               <a:endParaRPr lang="de-DE" dirty="0">
                 <a:latin typeface="Calibri" pitchFamily="34" charset="0"/>
@@ -15923,13 +15783,7 @@
                 <a:rPr lang="de-DE" dirty="0" smtClean="0">
                   <a:latin typeface="Calibri" pitchFamily="34" charset="0"/>
                 </a:rPr>
-                <a:t>Basisabfluss </a:t>
-              </a:r>
-              <a:r>
-                <a:rPr lang="de-DE" dirty="0" smtClean="0">
-                  <a:latin typeface="Calibri" pitchFamily="34" charset="0"/>
-                </a:rPr>
-                <a:t>QB </a:t>
+                <a:t>Basisabfluss QB </a:t>
               </a:r>
               <a:endParaRPr lang="de-DE" dirty="0">
                 <a:latin typeface="Calibri" pitchFamily="34" charset="0"/>
@@ -16122,13 +15976,7 @@
               <a:rPr lang="de-DE" sz="1800" dirty="0" smtClean="0">
                 <a:latin typeface="Calibri" pitchFamily="34" charset="0"/>
               </a:rPr>
-              <a:t>die </a:t>
-            </a:r>
-            <a:r>
-              <a:rPr lang="de-DE" sz="1800" dirty="0" smtClean="0">
-                <a:latin typeface="Calibri" pitchFamily="34" charset="0"/>
-              </a:rPr>
-              <a:t>Auffüllung des Bodens auf </a:t>
+              <a:t>die Auffüllung des Bodens auf </a:t>
             </a:r>
             <a:r>
               <a:rPr lang="de-DE" sz="1800" dirty="0" smtClean="0">
@@ -16331,9 +16179,6 @@
               </a:rPr>
               <a:t>Verdunstung und Bodenspeicher sind beschränkt! </a:t>
             </a:r>
-            <a:endParaRPr lang="de-DE" sz="1800" b="1" dirty="0" smtClean="0">
-              <a:latin typeface="Calibri" pitchFamily="34" charset="0"/>
-            </a:endParaRPr>
           </a:p>
         </p:txBody>
       </p:sp>
@@ -16652,16 +16497,6 @@
                 </a:rPr>
                 <a:t>i</a:t>
               </a:r>
-              <a:endParaRPr kumimoji="0" lang="de-DE" sz="1800" b="0" i="1" u="none" strike="noStrike" cap="none" normalizeH="0" baseline="-25000" dirty="0" smtClean="0">
-                <a:ln>
-                  <a:noFill/>
-                </a:ln>
-                <a:solidFill>
-                  <a:schemeClr val="tx1"/>
-                </a:solidFill>
-                <a:effectLst/>
-                <a:latin typeface="Calibri" pitchFamily="34" charset="0"/>
-              </a:endParaRPr>
             </a:p>
           </p:txBody>
         </p:sp>
@@ -16791,16 +16626,6 @@
                 </a:rPr>
                 <a:t>i</a:t>
               </a:r>
-              <a:endParaRPr kumimoji="0" lang="de-DE" sz="1800" b="0" i="1" u="none" strike="noStrike" cap="none" normalizeH="0" baseline="-25000" dirty="0" smtClean="0">
-                <a:ln>
-                  <a:noFill/>
-                </a:ln>
-                <a:solidFill>
-                  <a:schemeClr val="tx1"/>
-                </a:solidFill>
-                <a:effectLst/>
-                <a:latin typeface="Calibri" pitchFamily="34" charset="0"/>
-              </a:endParaRPr>
             </a:p>
           </p:txBody>
         </p:sp>
@@ -16843,18 +16668,7 @@
                 </a:solidFill>
                 <a:latin typeface="Calibri" pitchFamily="34" charset="0"/>
               </a:rPr>
-              <a:t>Das </a:t>
-            </a:r>
-            <a:r>
-              <a:rPr lang="de-DE" sz="2800" dirty="0" smtClean="0">
-                <a:solidFill>
-                  <a:schemeClr val="bg1">
-                    <a:lumMod val="85000"/>
-                  </a:schemeClr>
-                </a:solidFill>
-                <a:latin typeface="Calibri" pitchFamily="34" charset="0"/>
-              </a:rPr>
-              <a:t>abcd-Modell</a:t>
+              <a:t>Das abcd-Modell</a:t>
             </a:r>
           </a:p>
         </p:txBody>
@@ -16885,13 +16699,7 @@
               <a:rPr lang="de-DE" sz="2800" dirty="0" smtClean="0">
                 <a:latin typeface="Calibri" pitchFamily="34" charset="0"/>
               </a:rPr>
-              <a:t>Idee </a:t>
-            </a:r>
-            <a:r>
-              <a:rPr lang="de-DE" sz="2800" dirty="0" smtClean="0">
-                <a:latin typeface="Calibri" pitchFamily="34" charset="0"/>
-              </a:rPr>
-              <a:t>#2</a:t>
+              <a:t>Idee #2</a:t>
             </a:r>
             <a:endParaRPr lang="de-DE" sz="2800" dirty="0">
               <a:latin typeface="Calibri" pitchFamily="34" charset="0"/>
@@ -16935,9 +16743,6 @@
               </a:rPr>
               <a:t>Aufteilung zwischen Verdunstung und Boden</a:t>
             </a:r>
-            <a:endParaRPr lang="de-DE" sz="1800" b="1" dirty="0" smtClean="0">
-              <a:latin typeface="Calibri" pitchFamily="34" charset="0"/>
-            </a:endParaRPr>
           </a:p>
         </p:txBody>
       </p:sp>
@@ -16985,23 +16790,8 @@
               <a:rPr lang="de-DE" sz="1800" dirty="0" smtClean="0">
                 <a:latin typeface="Calibri" pitchFamily="34" charset="0"/>
               </a:rPr>
-              <a:t>Die Höhe der </a:t>
-            </a:r>
-            <a:r>
-              <a:rPr lang="de-DE" sz="1800" dirty="0" smtClean="0">
-                <a:latin typeface="Calibri" pitchFamily="34" charset="0"/>
-              </a:rPr>
-              <a:t>Verdunstung </a:t>
-            </a:r>
-            <a:r>
-              <a:rPr lang="de-DE" sz="1800" dirty="0" smtClean="0">
-                <a:latin typeface="Calibri" pitchFamily="34" charset="0"/>
-              </a:rPr>
-              <a:t>hängt ab von </a:t>
-            </a:r>
-            <a:endParaRPr lang="de-DE" sz="1800" dirty="0" smtClean="0">
-              <a:latin typeface="Calibri" pitchFamily="34" charset="0"/>
-            </a:endParaRPr>
+              <a:t>Die Höhe der Verdunstung hängt ab von </a:t>
+            </a:r>
           </a:p>
           <a:p>
             <a:pPr marL="174625" indent="-174625">
@@ -17047,13 +16837,7 @@
               <a:rPr lang="de-DE" sz="1800" dirty="0" smtClean="0">
                 <a:latin typeface="Calibri" pitchFamily="34" charset="0"/>
               </a:rPr>
-              <a:t>der </a:t>
-            </a:r>
-            <a:r>
-              <a:rPr lang="de-DE" sz="1800" dirty="0" smtClean="0">
-                <a:latin typeface="Calibri" pitchFamily="34" charset="0"/>
-              </a:rPr>
-              <a:t>relativen Sättigung des Bodens (</a:t>
+              <a:t>der relativen Sättigung des Bodens (</a:t>
             </a:r>
             <a:r>
               <a:rPr lang="de-DE" sz="1800" dirty="0" smtClean="0">
@@ -17631,13 +17415,7 @@
                 <a:rPr lang="de-DE" dirty="0" smtClean="0">
                   <a:latin typeface="Calibri" pitchFamily="34" charset="0"/>
                 </a:rPr>
-                <a:t>Direktabfluss </a:t>
-              </a:r>
-              <a:r>
-                <a:rPr lang="de-DE" dirty="0" smtClean="0">
-                  <a:latin typeface="Calibri" pitchFamily="34" charset="0"/>
-                </a:rPr>
-                <a:t>QD </a:t>
+                <a:t>Direktabfluss QD </a:t>
               </a:r>
               <a:endParaRPr lang="de-DE" dirty="0">
                 <a:latin typeface="Calibri" pitchFamily="34" charset="0"/>
@@ -17904,13 +17682,7 @@
                 <a:rPr lang="de-DE" dirty="0" smtClean="0">
                   <a:latin typeface="Calibri" pitchFamily="34" charset="0"/>
                 </a:rPr>
-                <a:t>Basisabfluss </a:t>
-              </a:r>
-              <a:r>
-                <a:rPr lang="de-DE" dirty="0" smtClean="0">
-                  <a:latin typeface="Calibri" pitchFamily="34" charset="0"/>
-                </a:rPr>
-                <a:t>QB </a:t>
+                <a:t>Basisabfluss QB </a:t>
               </a:r>
               <a:endParaRPr lang="de-DE" dirty="0">
                 <a:latin typeface="Calibri" pitchFamily="34" charset="0"/>
@@ -18088,16 +17860,6 @@
               </a:rPr>
               <a:t>i</a:t>
             </a:r>
-            <a:endParaRPr kumimoji="0" lang="de-DE" sz="1800" b="0" i="1" u="none" strike="noStrike" cap="none" normalizeH="0" baseline="-25000" dirty="0" smtClean="0">
-              <a:ln>
-                <a:noFill/>
-              </a:ln>
-              <a:solidFill>
-                <a:schemeClr val="tx1"/>
-              </a:solidFill>
-              <a:effectLst/>
-              <a:latin typeface="Calibri" pitchFamily="34" charset="0"/>
-            </a:endParaRPr>
           </a:p>
         </p:txBody>
       </p:sp>
@@ -18272,43 +18034,7 @@
                 <a:latin typeface="Calibri" pitchFamily="34" charset="0"/>
                 <a:sym typeface="Symbol"/>
               </a:rPr>
-              <a:t> 0, </a:t>
-            </a:r>
-            <a:r>
-              <a:rPr lang="de-DE" sz="1800" dirty="0" smtClean="0">
-                <a:solidFill>
-                  <a:schemeClr val="accent5">
-                    <a:lumMod val="50000"/>
-                  </a:schemeClr>
-                </a:solidFill>
-                <a:latin typeface="Calibri" pitchFamily="34" charset="0"/>
-                <a:sym typeface="Symbol"/>
-              </a:rPr>
-              <a:t>b </a:t>
-            </a:r>
-            <a:r>
-              <a:rPr lang="de-DE" sz="1800" dirty="0" smtClean="0">
-                <a:solidFill>
-                  <a:schemeClr val="accent5">
-                    <a:lumMod val="50000"/>
-                  </a:schemeClr>
-                </a:solidFill>
-                <a:latin typeface="Calibri" pitchFamily="34" charset="0"/>
-                <a:sym typeface="Symbol"/>
-              </a:rPr>
-              <a:t> </a:t>
-            </a:r>
-            <a:r>
-              <a:rPr lang="de-DE" sz="1800" dirty="0" smtClean="0">
-                <a:solidFill>
-                  <a:schemeClr val="accent5">
-                    <a:lumMod val="50000"/>
-                  </a:schemeClr>
-                </a:solidFill>
-                <a:latin typeface="Calibri" pitchFamily="34" charset="0"/>
-                <a:sym typeface="Symbol"/>
-              </a:rPr>
-              <a:t>.</a:t>
+              <a:t> 0, b  .</a:t>
             </a:r>
             <a:endParaRPr lang="de-DE" sz="1800" baseline="-25000" dirty="0">
               <a:solidFill>
@@ -19000,18 +18726,7 @@
                 </a:solidFill>
                 <a:latin typeface="Calibri" pitchFamily="34" charset="0"/>
               </a:rPr>
-              <a:t>Das </a:t>
-            </a:r>
-            <a:r>
-              <a:rPr lang="de-DE" sz="2800" dirty="0" smtClean="0">
-                <a:solidFill>
-                  <a:schemeClr val="bg1">
-                    <a:lumMod val="85000"/>
-                  </a:schemeClr>
-                </a:solidFill>
-                <a:latin typeface="Calibri" pitchFamily="34" charset="0"/>
-              </a:rPr>
-              <a:t>abcd-Modell</a:t>
+              <a:t>Das abcd-Modell</a:t>
             </a:r>
           </a:p>
         </p:txBody>
@@ -19042,13 +18757,7 @@
               <a:rPr lang="de-DE" sz="2800" dirty="0" smtClean="0">
                 <a:latin typeface="Calibri" pitchFamily="34" charset="0"/>
               </a:rPr>
-              <a:t>Idee </a:t>
-            </a:r>
-            <a:r>
-              <a:rPr lang="de-DE" sz="2800" dirty="0" smtClean="0">
-                <a:latin typeface="Calibri" pitchFamily="34" charset="0"/>
-              </a:rPr>
-              <a:t>#2</a:t>
+              <a:t>Idee #2</a:t>
             </a:r>
             <a:endParaRPr lang="de-DE" sz="2800" dirty="0">
               <a:latin typeface="Calibri" pitchFamily="34" charset="0"/>
@@ -19092,9 +18801,6 @@
               </a:rPr>
               <a:t>Aufteilung zwischen Verdunstung und Boden</a:t>
             </a:r>
-            <a:endParaRPr lang="de-DE" sz="1800" b="1" dirty="0" smtClean="0">
-              <a:latin typeface="Calibri" pitchFamily="34" charset="0"/>
-            </a:endParaRPr>
           </a:p>
         </p:txBody>
       </p:sp>
@@ -19162,23 +18868,8 @@
               <a:rPr lang="de-DE" sz="1800" dirty="0" smtClean="0">
                 <a:latin typeface="Calibri" pitchFamily="34" charset="0"/>
               </a:rPr>
-              <a:t>Die Höhe der </a:t>
-            </a:r>
-            <a:r>
-              <a:rPr lang="de-DE" sz="1800" dirty="0" smtClean="0">
-                <a:latin typeface="Calibri" pitchFamily="34" charset="0"/>
-              </a:rPr>
-              <a:t>Verdunstung </a:t>
-            </a:r>
-            <a:r>
-              <a:rPr lang="de-DE" sz="1800" dirty="0" smtClean="0">
-                <a:latin typeface="Calibri" pitchFamily="34" charset="0"/>
-              </a:rPr>
-              <a:t>hängt ab von </a:t>
-            </a:r>
-            <a:endParaRPr lang="de-DE" sz="1800" dirty="0" smtClean="0">
-              <a:latin typeface="Calibri" pitchFamily="34" charset="0"/>
-            </a:endParaRPr>
+              <a:t>Die Höhe der Verdunstung hängt ab von </a:t>
+            </a:r>
           </a:p>
           <a:p>
             <a:pPr marL="174625" indent="-174625">
@@ -19224,13 +18915,7 @@
               <a:rPr lang="de-DE" sz="1800" dirty="0" smtClean="0">
                 <a:latin typeface="Calibri" pitchFamily="34" charset="0"/>
               </a:rPr>
-              <a:t>der </a:t>
-            </a:r>
-            <a:r>
-              <a:rPr lang="de-DE" sz="1800" dirty="0" smtClean="0">
-                <a:latin typeface="Calibri" pitchFamily="34" charset="0"/>
-              </a:rPr>
-              <a:t>relativen Sättigung des Bodens (</a:t>
+              <a:t>der relativen Sättigung des Bodens (</a:t>
             </a:r>
             <a:r>
               <a:rPr lang="de-DE" sz="1800" dirty="0" smtClean="0">
@@ -19896,13 +19581,7 @@
                 <a:rPr lang="de-DE" dirty="0" smtClean="0">
                   <a:latin typeface="Calibri" pitchFamily="34" charset="0"/>
                 </a:rPr>
-                <a:t>Direktabfluss </a:t>
-              </a:r>
-              <a:r>
-                <a:rPr lang="de-DE" dirty="0" smtClean="0">
-                  <a:latin typeface="Calibri" pitchFamily="34" charset="0"/>
-                </a:rPr>
-                <a:t>QD </a:t>
+                <a:t>Direktabfluss QD </a:t>
               </a:r>
               <a:endParaRPr lang="de-DE" dirty="0">
                 <a:latin typeface="Calibri" pitchFamily="34" charset="0"/>
@@ -20169,13 +19848,7 @@
                 <a:rPr lang="de-DE" dirty="0" smtClean="0">
                   <a:latin typeface="Calibri" pitchFamily="34" charset="0"/>
                 </a:rPr>
-                <a:t>Basisabfluss </a:t>
-              </a:r>
-              <a:r>
-                <a:rPr lang="de-DE" dirty="0" smtClean="0">
-                  <a:latin typeface="Calibri" pitchFamily="34" charset="0"/>
-                </a:rPr>
-                <a:t>QB </a:t>
+                <a:t>Basisabfluss QB </a:t>
               </a:r>
               <a:endParaRPr lang="de-DE" dirty="0">
                 <a:latin typeface="Calibri" pitchFamily="34" charset="0"/>
@@ -20259,11 +19932,20 @@
               <a:rPr lang="de-DE" sz="1800" dirty="0" smtClean="0">
                 <a:latin typeface="Calibri" pitchFamily="34" charset="0"/>
               </a:rPr>
-              <a:t>Herleitung von x aus folgender Proportionalität und der Lösung der entsprechende DGL </a:t>
-            </a:r>
-            <a:endParaRPr lang="de-DE" sz="1800" dirty="0" smtClean="0">
-              <a:latin typeface="Calibri" pitchFamily="34" charset="0"/>
-            </a:endParaRPr>
+              <a:t>Herleitung von x aus folgender Proportionalität und der Lösung der </a:t>
+            </a:r>
+            <a:r>
+              <a:rPr lang="de-DE" sz="1800" dirty="0" smtClean="0">
+                <a:latin typeface="Calibri" pitchFamily="34" charset="0"/>
+              </a:rPr>
+              <a:t>entsprechenden </a:t>
+            </a:r>
+            <a:r>
+              <a:rPr lang="de-DE" sz="1800" dirty="0" smtClean="0">
+                <a:latin typeface="Calibri" pitchFamily="34" charset="0"/>
+              </a:rPr>
+              <a:t>DGL </a:t>
+            </a:r>
           </a:p>
         </p:txBody>
       </p:sp>
@@ -20371,9 +20053,6 @@
               </a:rPr>
               <a:t>(s. Thomas (1981), S. 25) </a:t>
             </a:r>
-            <a:endParaRPr lang="de-DE" sz="1800" i="1" dirty="0" smtClean="0">
-              <a:latin typeface="Calibri" pitchFamily="34" charset="0"/>
-            </a:endParaRPr>
           </a:p>
         </p:txBody>
       </p:sp>
@@ -20704,16 +20383,6 @@
               </a:rPr>
               <a:t>i</a:t>
             </a:r>
-            <a:endParaRPr kumimoji="0" lang="de-DE" sz="1800" b="0" i="1" u="none" strike="noStrike" cap="none" normalizeH="0" baseline="-25000" dirty="0" smtClean="0">
-              <a:ln>
-                <a:noFill/>
-              </a:ln>
-              <a:solidFill>
-                <a:schemeClr val="tx1"/>
-              </a:solidFill>
-              <a:effectLst/>
-              <a:latin typeface="Calibri" pitchFamily="34" charset="0"/>
-            </a:endParaRPr>
           </a:p>
         </p:txBody>
       </p:sp>
@@ -20837,16 +20506,6 @@
               </a:rPr>
               <a:t>i</a:t>
             </a:r>
-            <a:endParaRPr kumimoji="0" lang="de-DE" sz="1800" b="0" i="1" u="none" strike="noStrike" cap="none" normalizeH="0" baseline="-25000" dirty="0" smtClean="0">
-              <a:ln>
-                <a:noFill/>
-              </a:ln>
-              <a:solidFill>
-                <a:schemeClr val="tx1"/>
-              </a:solidFill>
-              <a:effectLst/>
-              <a:latin typeface="Calibri" pitchFamily="34" charset="0"/>
-            </a:endParaRPr>
           </a:p>
         </p:txBody>
       </p:sp>
@@ -20976,16 +20635,6 @@
               </a:rPr>
               <a:t>i</a:t>
             </a:r>
-            <a:endParaRPr kumimoji="0" lang="de-DE" sz="1800" b="0" i="1" u="none" strike="noStrike" cap="none" normalizeH="0" baseline="-25000" dirty="0" smtClean="0">
-              <a:ln>
-                <a:noFill/>
-              </a:ln>
-              <a:solidFill>
-                <a:schemeClr val="tx1"/>
-              </a:solidFill>
-              <a:effectLst/>
-              <a:latin typeface="Calibri" pitchFamily="34" charset="0"/>
-            </a:endParaRPr>
           </a:p>
         </p:txBody>
       </p:sp>
@@ -21062,18 +20711,7 @@
                 </a:solidFill>
                 <a:latin typeface="Calibri" pitchFamily="34" charset="0"/>
               </a:rPr>
-              <a:t>Das </a:t>
-            </a:r>
-            <a:r>
-              <a:rPr lang="de-DE" sz="2800" dirty="0" smtClean="0">
-                <a:solidFill>
-                  <a:schemeClr val="bg1">
-                    <a:lumMod val="85000"/>
-                  </a:schemeClr>
-                </a:solidFill>
-                <a:latin typeface="Calibri" pitchFamily="34" charset="0"/>
-              </a:rPr>
-              <a:t>abcd-Modell</a:t>
+              <a:t>Das abcd-Modell</a:t>
             </a:r>
           </a:p>
         </p:txBody>
@@ -21204,9 +20842,6 @@
               </a:rPr>
               <a:t> </a:t>
             </a:r>
-            <a:endParaRPr lang="de-DE" sz="1800" b="1" dirty="0" smtClean="0">
-              <a:latin typeface="Calibri" pitchFamily="34" charset="0"/>
-            </a:endParaRPr>
           </a:p>
         </p:txBody>
       </p:sp>
@@ -21456,9 +21091,6 @@
               </a:rPr>
               <a:t>Basisabfluss und Grundwasserspeicher</a:t>
             </a:r>
-            <a:endParaRPr lang="de-DE" sz="1800" b="1" dirty="0" smtClean="0">
-              <a:latin typeface="Calibri" pitchFamily="34" charset="0"/>
-            </a:endParaRPr>
           </a:p>
         </p:txBody>
       </p:sp>
@@ -21687,19 +21319,7 @@
               <a:rPr lang="de-DE" sz="1800" dirty="0" smtClean="0">
                 <a:latin typeface="Calibri" pitchFamily="34" charset="0"/>
               </a:rPr>
-              <a:t> ergibt sich </a:t>
-            </a:r>
-            <a:r>
-              <a:rPr lang="de-DE" sz="1800" dirty="0" smtClean="0">
-                <a:latin typeface="Calibri" pitchFamily="34" charset="0"/>
-              </a:rPr>
-              <a:t>aus der Bilanzierung </a:t>
-            </a:r>
-            <a:r>
-              <a:rPr lang="de-DE" sz="1800" dirty="0" smtClean="0">
-                <a:latin typeface="Calibri" pitchFamily="34" charset="0"/>
-              </a:rPr>
-              <a:t>von </a:t>
+              <a:t> ergibt sich aus der Bilanzierung von </a:t>
             </a:r>
             <a:r>
               <a:rPr lang="de-DE" sz="1800" dirty="0" smtClean="0">
@@ -22362,13 +21982,7 @@
                 <a:rPr lang="de-DE" dirty="0" smtClean="0">
                   <a:latin typeface="Calibri" pitchFamily="34" charset="0"/>
                 </a:rPr>
-                <a:t>Direktabfluss </a:t>
-              </a:r>
-              <a:r>
-                <a:rPr lang="de-DE" dirty="0" smtClean="0">
-                  <a:latin typeface="Calibri" pitchFamily="34" charset="0"/>
-                </a:rPr>
-                <a:t>QD </a:t>
+                <a:t>Direktabfluss QD </a:t>
               </a:r>
               <a:endParaRPr lang="de-DE" dirty="0">
                 <a:latin typeface="Calibri" pitchFamily="34" charset="0"/>
@@ -22635,13 +22249,7 @@
                 <a:rPr lang="de-DE" dirty="0" smtClean="0">
                   <a:latin typeface="Calibri" pitchFamily="34" charset="0"/>
                 </a:rPr>
-                <a:t>Basisabfluss </a:t>
-              </a:r>
-              <a:r>
-                <a:rPr lang="de-DE" dirty="0" smtClean="0">
-                  <a:latin typeface="Calibri" pitchFamily="34" charset="0"/>
-                </a:rPr>
-                <a:t>QB </a:t>
+                <a:t>Basisabfluss QB </a:t>
               </a:r>
               <a:endParaRPr lang="de-DE" dirty="0">
                 <a:latin typeface="Calibri" pitchFamily="34" charset="0"/>
@@ -23397,18 +23005,7 @@
                 </a:solidFill>
                 <a:latin typeface="Calibri" pitchFamily="34" charset="0"/>
               </a:rPr>
-              <a:t>Das </a:t>
-            </a:r>
-            <a:r>
-              <a:rPr lang="de-DE" sz="2800" dirty="0" smtClean="0">
-                <a:solidFill>
-                  <a:schemeClr val="bg1">
-                    <a:lumMod val="85000"/>
-                  </a:schemeClr>
-                </a:solidFill>
-                <a:latin typeface="Calibri" pitchFamily="34" charset="0"/>
-              </a:rPr>
-              <a:t>abcd-Modell</a:t>
+              <a:t>Das abcd-Modell</a:t>
             </a:r>
           </a:p>
         </p:txBody>
@@ -23439,17 +23036,8 @@
               <a:rPr lang="de-DE" sz="2800" dirty="0" smtClean="0">
                 <a:latin typeface="Calibri" pitchFamily="34" charset="0"/>
               </a:rPr>
-              <a:t>Überblick über die Wasserbilanz eines </a:t>
-            </a:r>
-            <a:r>
-              <a:rPr lang="de-DE" sz="2800" dirty="0" smtClean="0">
-                <a:latin typeface="Calibri" pitchFamily="34" charset="0"/>
-              </a:rPr>
-              <a:t>Monats</a:t>
-            </a:r>
-            <a:endParaRPr lang="de-DE" sz="2800" dirty="0" smtClean="0">
-              <a:latin typeface="Calibri" pitchFamily="34" charset="0"/>
-            </a:endParaRPr>
+              <a:t>Überblick über die Wasserbilanz eines Monats</a:t>
+            </a:r>
           </a:p>
         </p:txBody>
       </p:sp>
@@ -23786,13 +23374,7 @@
               <a:rPr lang="de-DE" b="1" dirty="0" smtClean="0">
                 <a:latin typeface="Calibri" pitchFamily="34" charset="0"/>
               </a:rPr>
-              <a:t>2. Berechne </a:t>
-            </a:r>
-            <a:r>
-              <a:rPr lang="de-DE" b="1" dirty="0" smtClean="0">
-                <a:latin typeface="Calibri" pitchFamily="34" charset="0"/>
-              </a:rPr>
-              <a:t>Bodenfeuchte </a:t>
+              <a:t>2. Berechne Bodenfeuchte </a:t>
             </a:r>
             <a:r>
               <a:rPr lang="de-DE" sz="1400" b="1" dirty="0" smtClean="0">
@@ -24720,13 +24302,7 @@
                 <a:rPr lang="de-DE" dirty="0" smtClean="0">
                   <a:latin typeface="Calibri" pitchFamily="34" charset="0"/>
                 </a:rPr>
-                <a:t>Direktabfluss </a:t>
-              </a:r>
-              <a:r>
-                <a:rPr lang="de-DE" dirty="0" smtClean="0">
-                  <a:latin typeface="Calibri" pitchFamily="34" charset="0"/>
-                </a:rPr>
-                <a:t>QD </a:t>
+                <a:t>Direktabfluss QD </a:t>
               </a:r>
               <a:endParaRPr lang="de-DE" dirty="0">
                 <a:latin typeface="Calibri" pitchFamily="34" charset="0"/>
@@ -24993,13 +24569,7 @@
                 <a:rPr lang="de-DE" dirty="0" smtClean="0">
                   <a:latin typeface="Calibri" pitchFamily="34" charset="0"/>
                 </a:rPr>
-                <a:t>Basisabfluss </a:t>
-              </a:r>
-              <a:r>
-                <a:rPr lang="de-DE" dirty="0" smtClean="0">
-                  <a:latin typeface="Calibri" pitchFamily="34" charset="0"/>
-                </a:rPr>
-                <a:t>QB </a:t>
+                <a:t>Basisabfluss QB </a:t>
               </a:r>
               <a:endParaRPr lang="de-DE" dirty="0">
                 <a:latin typeface="Calibri" pitchFamily="34" charset="0"/>
@@ -25303,18 +24873,7 @@
                 </a:solidFill>
                 <a:latin typeface="Calibri" pitchFamily="34" charset="0"/>
               </a:rPr>
-              <a:t>Das </a:t>
-            </a:r>
-            <a:r>
-              <a:rPr lang="de-DE" sz="2800" dirty="0" smtClean="0">
-                <a:solidFill>
-                  <a:schemeClr val="bg1">
-                    <a:lumMod val="85000"/>
-                  </a:schemeClr>
-                </a:solidFill>
-                <a:latin typeface="Calibri" pitchFamily="34" charset="0"/>
-              </a:rPr>
-              <a:t>abcd-Modell</a:t>
+              <a:t>Das abcd-Modell</a:t>
             </a:r>
           </a:p>
         </p:txBody>
@@ -25515,17 +25074,8 @@
               <a:rPr lang="de-DE" sz="2800" dirty="0" smtClean="0">
                 <a:latin typeface="Calibri" pitchFamily="34" charset="0"/>
               </a:rPr>
-              <a:t>Überblick über die Wasserbilanz eines </a:t>
-            </a:r>
-            <a:r>
-              <a:rPr lang="de-DE" sz="2800" dirty="0" smtClean="0">
-                <a:latin typeface="Calibri" pitchFamily="34" charset="0"/>
-              </a:rPr>
-              <a:t>Monats</a:t>
-            </a:r>
-            <a:endParaRPr lang="de-DE" sz="2800" dirty="0" smtClean="0">
-              <a:latin typeface="Calibri" pitchFamily="34" charset="0"/>
-            </a:endParaRPr>
+              <a:t>Überblick über die Wasserbilanz eines Monats</a:t>
+            </a:r>
           </a:p>
         </p:txBody>
       </p:sp>
@@ -25862,13 +25412,7 @@
               <a:rPr lang="de-DE" b="1" dirty="0" smtClean="0">
                 <a:latin typeface="Calibri" pitchFamily="34" charset="0"/>
               </a:rPr>
-              <a:t>2. Berechne </a:t>
-            </a:r>
-            <a:r>
-              <a:rPr lang="de-DE" b="1" dirty="0" smtClean="0">
-                <a:latin typeface="Calibri" pitchFamily="34" charset="0"/>
-              </a:rPr>
-              <a:t>Bodenfeuchte </a:t>
+              <a:t>2. Berechne Bodenfeuchte </a:t>
             </a:r>
             <a:r>
               <a:rPr lang="de-DE" sz="1400" b="1" dirty="0" smtClean="0">
@@ -26796,13 +26340,7 @@
                 <a:rPr lang="de-DE" dirty="0" smtClean="0">
                   <a:latin typeface="Calibri" pitchFamily="34" charset="0"/>
                 </a:rPr>
-                <a:t>Direktabfluss </a:t>
-              </a:r>
-              <a:r>
-                <a:rPr lang="de-DE" dirty="0" smtClean="0">
-                  <a:latin typeface="Calibri" pitchFamily="34" charset="0"/>
-                </a:rPr>
-                <a:t>QD </a:t>
+                <a:t>Direktabfluss QD </a:t>
               </a:r>
               <a:endParaRPr lang="de-DE" dirty="0">
                 <a:latin typeface="Calibri" pitchFamily="34" charset="0"/>
@@ -27069,13 +26607,7 @@
                 <a:rPr lang="de-DE" dirty="0" smtClean="0">
                   <a:latin typeface="Calibri" pitchFamily="34" charset="0"/>
                 </a:rPr>
-                <a:t>Basisabfluss </a:t>
-              </a:r>
-              <a:r>
-                <a:rPr lang="de-DE" dirty="0" smtClean="0">
-                  <a:latin typeface="Calibri" pitchFamily="34" charset="0"/>
-                </a:rPr>
-                <a:t>QB </a:t>
+                <a:t>Basisabfluss QB </a:t>
               </a:r>
               <a:endParaRPr lang="de-DE" dirty="0">
                 <a:latin typeface="Calibri" pitchFamily="34" charset="0"/>
@@ -27652,14 +27184,6 @@
               </a:rPr>
               <a:t>MOPEX</a:t>
             </a:r>
-            <a:endParaRPr lang="de-DE" sz="2800" dirty="0" smtClean="0">
-              <a:solidFill>
-                <a:schemeClr val="bg1">
-                  <a:lumMod val="85000"/>
-                </a:schemeClr>
-              </a:solidFill>
-              <a:latin typeface="Calibri" pitchFamily="34" charset="0"/>
-            </a:endParaRPr>
           </a:p>
         </p:txBody>
       </p:sp>
@@ -27689,13 +27213,7 @@
               <a:rPr lang="de-DE" sz="2800" dirty="0" smtClean="0">
                 <a:latin typeface="Calibri" pitchFamily="34" charset="0"/>
               </a:rPr>
-              <a:t>MOPEX</a:t>
-            </a:r>
-            <a:r>
-              <a:rPr lang="de-DE" sz="2800" dirty="0" smtClean="0">
-                <a:latin typeface="Calibri" pitchFamily="34" charset="0"/>
-              </a:rPr>
-              <a:t>: </a:t>
+              <a:t>MOPEX: </a:t>
             </a:r>
             <a:r>
               <a:rPr lang="de-DE" sz="2800" b="1" dirty="0" err="1" smtClean="0">
@@ -27808,9 +27326,6 @@
               </a:rPr>
               <a:t>homogener Datensatz für 431 Einzugsgebiete in den USA</a:t>
             </a:r>
-            <a:endParaRPr lang="de-DE" sz="2400" dirty="0" smtClean="0">
-              <a:latin typeface="Calibri" pitchFamily="34" charset="0"/>
-            </a:endParaRPr>
           </a:p>
           <a:p>
             <a:pPr marL="355600" indent="-355600">
@@ -27889,9 +27404,6 @@
               </a:rPr>
               <a:t>tägliche Auflösung (für diesen Kurs: Monatsmittelwerte)</a:t>
             </a:r>
-            <a:endParaRPr lang="de-DE" sz="2400" dirty="0" smtClean="0">
-              <a:latin typeface="Calibri" pitchFamily="34" charset="0"/>
-            </a:endParaRPr>
           </a:p>
         </p:txBody>
       </p:sp>
@@ -27927,14 +27439,7 @@
                 <a:latin typeface="Calibri" pitchFamily="34" charset="0"/>
                 <a:hlinkClick r:id="rId4"/>
               </a:rPr>
-              <a:t>ftp://</a:t>
-            </a:r>
-            <a:r>
-              <a:rPr lang="de-DE" sz="3000" dirty="0" smtClean="0">
-                <a:latin typeface="Calibri" pitchFamily="34" charset="0"/>
-                <a:hlinkClick r:id="rId4"/>
-              </a:rPr>
-              <a:t>hydrology.nws.noaa.gov/pub/gcip/mopex/US_Data</a:t>
+              <a:t>ftp://hydrology.nws.noaa.gov/pub/gcip/mopex/US_Data</a:t>
             </a:r>
             <a:r>
               <a:rPr lang="de-DE" sz="3000" dirty="0" smtClean="0">
@@ -28397,10 +27902,10 @@
               </a:spcAft>
             </a:pPr>
             <a:r>
-              <a:rPr lang="en-GB" sz="2400" dirty="0" smtClean="0">
-                <a:latin typeface="Calibri" pitchFamily="34" charset="0"/>
-              </a:rPr>
-              <a:t>Quizfight</a:t>
+              <a:rPr lang="en-GB" sz="2400" dirty="0" err="1" smtClean="0">
+                <a:latin typeface="Calibri" pitchFamily="34" charset="0"/>
+              </a:rPr>
+              <a:t>Routinekämpfe</a:t>
             </a:r>
             <a:endParaRPr lang="en-GB" sz="2400" dirty="0" smtClean="0">
               <a:latin typeface="Calibri" pitchFamily="34" charset="0"/>
@@ -28517,17 +28022,8 @@
               <a:rPr lang="de-DE" sz="2800" dirty="0" smtClean="0">
                 <a:latin typeface="Calibri" pitchFamily="34" charset="0"/>
               </a:rPr>
-              <a:t>Abfluss als Komponente des </a:t>
-            </a:r>
-            <a:r>
-              <a:rPr lang="de-DE" sz="2800" dirty="0" smtClean="0">
-                <a:latin typeface="Calibri" pitchFamily="34" charset="0"/>
-              </a:rPr>
-              <a:t>Wasserhaushalts</a:t>
-            </a:r>
-            <a:endParaRPr lang="de-DE" sz="2800" dirty="0" smtClean="0">
-              <a:latin typeface="Calibri" pitchFamily="34" charset="0"/>
-            </a:endParaRPr>
+              <a:t>Abfluss als Komponente des Wasserhaushalts</a:t>
+            </a:r>
           </a:p>
         </p:txBody>
       </p:sp>
@@ -33812,18 +33308,7 @@
                 </a:solidFill>
                 <a:latin typeface="Calibri" pitchFamily="34" charset="0"/>
               </a:rPr>
-              <a:t>Das </a:t>
-            </a:r>
-            <a:r>
-              <a:rPr lang="de-DE" sz="2800" dirty="0" smtClean="0">
-                <a:solidFill>
-                  <a:schemeClr val="bg1">
-                    <a:lumMod val="85000"/>
-                  </a:schemeClr>
-                </a:solidFill>
-                <a:latin typeface="Calibri" pitchFamily="34" charset="0"/>
-              </a:rPr>
-              <a:t>abcd-Modell</a:t>
+              <a:t>Das abcd-Modell</a:t>
             </a:r>
           </a:p>
         </p:txBody>
@@ -34402,13 +33887,7 @@
               <a:rPr lang="de-DE" dirty="0" smtClean="0">
                 <a:latin typeface="Calibri" pitchFamily="34" charset="0"/>
               </a:rPr>
-              <a:t>Direktabfluss </a:t>
-            </a:r>
-            <a:r>
-              <a:rPr lang="de-DE" dirty="0" smtClean="0">
-                <a:latin typeface="Calibri" pitchFamily="34" charset="0"/>
-              </a:rPr>
-              <a:t>QD </a:t>
+              <a:t>Direktabfluss QD </a:t>
             </a:r>
             <a:endParaRPr lang="de-DE" dirty="0">
               <a:latin typeface="Calibri" pitchFamily="34" charset="0"/>
@@ -34675,13 +34154,7 @@
               <a:rPr lang="de-DE" dirty="0" smtClean="0">
                 <a:latin typeface="Calibri" pitchFamily="34" charset="0"/>
               </a:rPr>
-              <a:t>Basisabfluss </a:t>
-            </a:r>
-            <a:r>
-              <a:rPr lang="de-DE" dirty="0" smtClean="0">
-                <a:latin typeface="Calibri" pitchFamily="34" charset="0"/>
-              </a:rPr>
-              <a:t>QB </a:t>
+              <a:t>Basisabfluss QB </a:t>
             </a:r>
             <a:endParaRPr lang="de-DE" dirty="0">
               <a:latin typeface="Calibri" pitchFamily="34" charset="0"/>
@@ -36264,7 +35737,7 @@
                                 </p:cTn>
                               </p:par>
                               <p:par>
-                                <p:cTn id="73" presetID="9" presetClass="entr" presetSubtype="0" fill="hold" grpId="0" nodeType="withEffect">
+                                <p:cTn id="73" presetID="9" presetClass="entr" presetSubtype="0" fill="hold" nodeType="withEffect">
                                   <p:stCondLst>
                                     <p:cond delay="0"/>
                                   </p:stCondLst>
@@ -36401,18 +35874,7 @@
                 </a:solidFill>
                 <a:latin typeface="Calibri" pitchFamily="34" charset="0"/>
               </a:rPr>
-              <a:t>Das </a:t>
-            </a:r>
-            <a:r>
-              <a:rPr lang="de-DE" sz="2800" dirty="0" smtClean="0">
-                <a:solidFill>
-                  <a:schemeClr val="bg1">
-                    <a:lumMod val="85000"/>
-                  </a:schemeClr>
-                </a:solidFill>
-                <a:latin typeface="Calibri" pitchFamily="34" charset="0"/>
-              </a:rPr>
-              <a:t>abcd-Modell</a:t>
+              <a:t>Das abcd-Modell</a:t>
             </a:r>
           </a:p>
         </p:txBody>
@@ -36499,13 +35961,6 @@
               </a:rPr>
               <a:t>S</a:t>
             </a:r>
-            <a:endParaRPr lang="de-DE" sz="1800" dirty="0" smtClean="0">
-              <a:solidFill>
-                <a:srgbClr val="3366FF"/>
-              </a:solidFill>
-              <a:latin typeface="Courier New" pitchFamily="49" charset="0"/>
-              <a:cs typeface="Courier New" pitchFamily="49" charset="0"/>
-            </a:endParaRPr>
           </a:p>
           <a:p>
             <a:pPr marL="174625" indent="-174625">
@@ -36574,9 +36029,6 @@
               </a:rPr>
               <a:t>,</a:t>
             </a:r>
-            <a:endParaRPr lang="de-DE" sz="1800" dirty="0" smtClean="0">
-              <a:latin typeface="Calibri" pitchFamily="34" charset="0"/>
-            </a:endParaRPr>
           </a:p>
           <a:p>
             <a:pPr marL="174625" indent="-174625">
@@ -36605,13 +36057,6 @@
               </a:rPr>
               <a:t>RG</a:t>
             </a:r>
-            <a:endParaRPr lang="de-DE" sz="1800" dirty="0" smtClean="0">
-              <a:solidFill>
-                <a:srgbClr val="3366FF"/>
-              </a:solidFill>
-              <a:latin typeface="Courier New" pitchFamily="49" charset="0"/>
-              <a:cs typeface="Courier New" pitchFamily="49" charset="0"/>
-            </a:endParaRPr>
           </a:p>
         </p:txBody>
       </p:sp>
@@ -36707,13 +36152,7 @@
               <a:rPr lang="de-DE" sz="1800" dirty="0" smtClean="0">
                 <a:latin typeface="Calibri" pitchFamily="34" charset="0"/>
               </a:rPr>
-              <a:t>der </a:t>
-            </a:r>
-            <a:r>
-              <a:rPr lang="de-DE" sz="1800" dirty="0" smtClean="0">
-                <a:latin typeface="Calibri" pitchFamily="34" charset="0"/>
-              </a:rPr>
-              <a:t>Anfangsbodenfeuchte </a:t>
+              <a:t>der Anfangsbodenfeuchte </a:t>
             </a:r>
             <a:r>
               <a:rPr lang="de-DE" sz="1800" dirty="0" smtClean="0">
@@ -36735,13 +36174,6 @@
               </a:rPr>
               <a:t>i-1</a:t>
             </a:r>
-            <a:endParaRPr lang="de-DE" sz="1800" baseline="-25000" dirty="0" smtClean="0">
-              <a:solidFill>
-                <a:srgbClr val="3366FF"/>
-              </a:solidFill>
-              <a:latin typeface="Courier New" pitchFamily="49" charset="0"/>
-              <a:cs typeface="Courier New" pitchFamily="49" charset="0"/>
-            </a:endParaRPr>
           </a:p>
         </p:txBody>
       </p:sp>
@@ -36779,13 +36211,7 @@
               <a:rPr lang="de-DE" sz="1800" b="1" dirty="0" smtClean="0">
                 <a:latin typeface="Calibri" pitchFamily="34" charset="0"/>
               </a:rPr>
-              <a:t>Aufteilung </a:t>
-            </a:r>
-            <a:r>
-              <a:rPr lang="de-DE" sz="1800" b="1" dirty="0" smtClean="0">
-                <a:latin typeface="Calibri" pitchFamily="34" charset="0"/>
-              </a:rPr>
-              <a:t>des monatlichen Niederschlags </a:t>
+              <a:t>Aufteilung des monatlichen Niederschlags </a:t>
             </a:r>
             <a:r>
               <a:rPr lang="de-DE" sz="1800" dirty="0" smtClean="0">
@@ -36803,9 +36229,6 @@
               </a:rPr>
               <a:t>  in</a:t>
             </a:r>
-            <a:endParaRPr lang="de-DE" sz="1800" b="1" dirty="0" smtClean="0">
-              <a:latin typeface="Calibri" pitchFamily="34" charset="0"/>
-            </a:endParaRPr>
           </a:p>
         </p:txBody>
       </p:sp>
@@ -37406,13 +36829,7 @@
                 <a:rPr lang="de-DE" dirty="0" smtClean="0">
                   <a:latin typeface="Calibri" pitchFamily="34" charset="0"/>
                 </a:rPr>
-                <a:t>Direktabfluss </a:t>
-              </a:r>
-              <a:r>
-                <a:rPr lang="de-DE" dirty="0" smtClean="0">
-                  <a:latin typeface="Calibri" pitchFamily="34" charset="0"/>
-                </a:rPr>
-                <a:t>QD </a:t>
+                <a:t>Direktabfluss QD </a:t>
               </a:r>
               <a:endParaRPr lang="de-DE" dirty="0">
                 <a:latin typeface="Calibri" pitchFamily="34" charset="0"/>
@@ -37679,13 +37096,7 @@
                 <a:rPr lang="de-DE" dirty="0" smtClean="0">
                   <a:latin typeface="Calibri" pitchFamily="34" charset="0"/>
                 </a:rPr>
-                <a:t>Basisabfluss </a:t>
-              </a:r>
-              <a:r>
-                <a:rPr lang="de-DE" dirty="0" smtClean="0">
-                  <a:latin typeface="Calibri" pitchFamily="34" charset="0"/>
-                </a:rPr>
-                <a:t>QB </a:t>
+                <a:t>Basisabfluss QB </a:t>
               </a:r>
               <a:endParaRPr lang="de-DE" dirty="0">
                 <a:latin typeface="Calibri" pitchFamily="34" charset="0"/>
@@ -37771,9 +37182,6 @@
               </a:rPr>
               <a:t>Basisabfluss</a:t>
             </a:r>
-            <a:endParaRPr lang="de-DE" sz="1800" b="1" dirty="0" smtClean="0">
-              <a:latin typeface="Calibri" pitchFamily="34" charset="0"/>
-            </a:endParaRPr>
           </a:p>
         </p:txBody>
       </p:sp>

</xml_diff>

<commit_message>
- discussed changes in explanation of abcd-modell - Duzen in codefights
</commit_message>
<xml_diff>
--- a/Termin_3/folien/UebungModellierung#3.pptx
+++ b/Termin_3/folien/UebungModellierung#3.pptx
@@ -406,7 +406,7 @@
     </p:spTree>
     <p:extLst>
       <p:ext uri="{BB962C8B-B14F-4D97-AF65-F5344CB8AC3E}">
-        <p14:creationId xmlns:p14="http://schemas.microsoft.com/office/powerpoint/2010/main" xmlns="" val="1882660213"/>
+        <p14:creationId xmlns="" xmlns:p14="http://schemas.microsoft.com/office/powerpoint/2010/main" val="1882660213"/>
       </p:ext>
     </p:extLst>
   </p:cSld>
@@ -745,7 +745,7 @@
     </p:spTree>
     <p:extLst>
       <p:ext uri="{BB962C8B-B14F-4D97-AF65-F5344CB8AC3E}">
-        <p14:creationId xmlns:p14="http://schemas.microsoft.com/office/powerpoint/2010/main" xmlns="" val="2781074432"/>
+        <p14:creationId xmlns="" xmlns:p14="http://schemas.microsoft.com/office/powerpoint/2010/main" val="2781074432"/>
       </p:ext>
     </p:extLst>
   </p:cSld>
@@ -12258,20 +12258,31 @@
                 </a:solidFill>
                 <a:latin typeface="Calibri" pitchFamily="34" charset="0"/>
               </a:rPr>
-              <a:t>Was passiert mit dem Überschuss </a:t>
+              <a:t>Was passiert mit dem </a:t>
             </a:r>
             <a:r>
               <a:rPr lang="de-DE" sz="1800" dirty="0" smtClean="0">
+                <a:solidFill>
+                  <a:schemeClr val="accent5">
+                    <a:lumMod val="50000"/>
+                  </a:schemeClr>
+                </a:solidFill>
+                <a:latin typeface="Calibri" pitchFamily="34" charset="0"/>
+              </a:rPr>
+              <a:t>Überschuss </a:t>
+            </a:r>
+            <a:r>
+              <a:rPr lang="de-DE" sz="1800" dirty="0" err="1" smtClean="0">
                 <a:solidFill>
                   <a:srgbClr val="3366FF"/>
                 </a:solidFill>
                 <a:latin typeface="Courier New" pitchFamily="49" charset="0"/>
                 <a:cs typeface="Courier New" pitchFamily="49" charset="0"/>
               </a:rPr>
-              <a:t>Y</a:t>
-            </a:r>
-            <a:r>
-              <a:rPr lang="de-DE" sz="1800" baseline="-25000" dirty="0" smtClean="0">
+              <a:t>W</a:t>
+            </a:r>
+            <a:r>
+              <a:rPr lang="de-DE" sz="1800" baseline="-25000" dirty="0" err="1" smtClean="0">
                 <a:solidFill>
                   <a:srgbClr val="3366FF"/>
                 </a:solidFill>
@@ -12288,20 +12299,10 @@
                 <a:latin typeface="Courier New" pitchFamily="49" charset="0"/>
                 <a:cs typeface="Courier New" pitchFamily="49" charset="0"/>
               </a:rPr>
-              <a:t>–</a:t>
-            </a:r>
-            <a:r>
-              <a:rPr lang="de-DE" sz="1800" dirty="0" err="1" smtClean="0">
-                <a:solidFill>
-                  <a:srgbClr val="3366FF"/>
-                </a:solidFill>
-                <a:latin typeface="Courier New" pitchFamily="49" charset="0"/>
-                <a:cs typeface="Courier New" pitchFamily="49" charset="0"/>
-              </a:rPr>
-              <a:t>W</a:t>
-            </a:r>
-            <a:r>
-              <a:rPr lang="de-DE" sz="1800" baseline="-25000" dirty="0" err="1" smtClean="0">
+              <a:t>-Y</a:t>
+            </a:r>
+            <a:r>
+              <a:rPr lang="de-DE" sz="1800" baseline="-25000" dirty="0" smtClean="0">
                 <a:solidFill>
                   <a:srgbClr val="3366FF"/>
                 </a:solidFill>
@@ -16154,7 +16155,7 @@
       </p:sp>
       <p:pic>
         <p:nvPicPr>
-          <p:cNvPr id="45" name="Picture 7"/>
+          <p:cNvPr id="120835" name="Picture 3"/>
           <p:cNvPicPr>
             <a:picLocks noChangeAspect="1" noChangeArrowheads="1"/>
           </p:cNvPicPr>
@@ -16162,15 +16163,15 @@
         </p:nvPicPr>
         <p:blipFill>
           <a:blip r:embed="rId3" cstate="print"/>
-          <a:srcRect t="16321" r="6576" b="2041"/>
+          <a:srcRect/>
           <a:stretch>
             <a:fillRect/>
           </a:stretch>
         </p:blipFill>
         <p:spPr bwMode="auto">
           <a:xfrm>
-            <a:off x="395536" y="3356992"/>
-            <a:ext cx="3887986" cy="2880320"/>
+            <a:off x="145157" y="3356992"/>
+            <a:ext cx="4714875" cy="2867025"/>
           </a:xfrm>
           <a:prstGeom prst="rect">
             <a:avLst/>
@@ -16182,6 +16183,7 @@
             <a:headEnd/>
             <a:tailEnd/>
           </a:ln>
+          <a:effectLst/>
         </p:spPr>
       </p:pic>
     </p:spTree>
@@ -16686,7 +16688,7 @@
         <p:spPr>
           <a:xfrm>
             <a:off x="250825" y="1484784"/>
-            <a:ext cx="5041255" cy="369332"/>
+            <a:ext cx="5041255" cy="646331"/>
           </a:xfrm>
           <a:prstGeom prst="rect">
             <a:avLst/>
@@ -16711,8 +16713,93 @@
               <a:rPr lang="de-DE" sz="1800" b="1" dirty="0" smtClean="0">
                 <a:latin typeface="Calibri" pitchFamily="34" charset="0"/>
               </a:rPr>
-              <a:t>Aufteilung zwischen Verdunstung und Boden</a:t>
-            </a:r>
+              <a:t>Aufteilung von </a:t>
+            </a:r>
+            <a:r>
+              <a:rPr lang="de-DE" sz="1800" i="1" dirty="0" smtClean="0">
+                <a:latin typeface="Calibri" pitchFamily="34" charset="0"/>
+              </a:rPr>
+              <a:t>Y</a:t>
+            </a:r>
+            <a:r>
+              <a:rPr lang="de-DE" sz="1800" i="1" baseline="-25000" dirty="0" smtClean="0">
+                <a:latin typeface="Calibri" pitchFamily="34" charset="0"/>
+              </a:rPr>
+              <a:t>i</a:t>
+            </a:r>
+            <a:r>
+              <a:rPr lang="de-DE" sz="1800" b="1" dirty="0" smtClean="0">
+                <a:latin typeface="Calibri" pitchFamily="34" charset="0"/>
+              </a:rPr>
+              <a:t> </a:t>
+            </a:r>
+            <a:r>
+              <a:rPr lang="de-DE" sz="1800" b="1" dirty="0" smtClean="0">
+                <a:latin typeface="Calibri" pitchFamily="34" charset="0"/>
+              </a:rPr>
+              <a:t>zwischen </a:t>
+            </a:r>
+            <a:r>
+              <a:rPr lang="de-DE" sz="1800" b="1" dirty="0" smtClean="0">
+                <a:latin typeface="Calibri" pitchFamily="34" charset="0"/>
+              </a:rPr>
+              <a:t>Verdunstung </a:t>
+            </a:r>
+            <a:r>
+              <a:rPr lang="de-DE" sz="1800" dirty="0" smtClean="0">
+                <a:latin typeface="Calibri" pitchFamily="34" charset="0"/>
+              </a:rPr>
+              <a:t> </a:t>
+            </a:r>
+            <a:r>
+              <a:rPr lang="de-DE" sz="1800" dirty="0" smtClean="0">
+                <a:latin typeface="Courier New" pitchFamily="49" charset="0"/>
+                <a:cs typeface="Courier New" pitchFamily="49" charset="0"/>
+              </a:rPr>
+              <a:t>E</a:t>
+            </a:r>
+            <a:r>
+              <a:rPr lang="de-DE" sz="1800" baseline="-25000" dirty="0" smtClean="0">
+                <a:latin typeface="Courier New" pitchFamily="49" charset="0"/>
+                <a:cs typeface="Courier New" pitchFamily="49" charset="0"/>
+              </a:rPr>
+              <a:t>i</a:t>
+            </a:r>
+            <a:r>
+              <a:rPr lang="de-DE" sz="1800" b="1" dirty="0" smtClean="0">
+                <a:latin typeface="Calibri" pitchFamily="34" charset="0"/>
+              </a:rPr>
+              <a:t> </a:t>
+            </a:r>
+            <a:r>
+              <a:rPr lang="de-DE" sz="1800" b="1" dirty="0" smtClean="0">
+                <a:latin typeface="Calibri" pitchFamily="34" charset="0"/>
+              </a:rPr>
+              <a:t>und </a:t>
+            </a:r>
+            <a:r>
+              <a:rPr lang="de-DE" sz="1800" dirty="0" smtClean="0">
+                <a:latin typeface="Courier New" pitchFamily="49" charset="0"/>
+                <a:cs typeface="Courier New" pitchFamily="49" charset="0"/>
+              </a:rPr>
+              <a:t>S</a:t>
+            </a:r>
+            <a:r>
+              <a:rPr lang="de-DE" sz="1800" baseline="-25000" dirty="0" smtClean="0">
+                <a:latin typeface="Courier New" pitchFamily="49" charset="0"/>
+                <a:cs typeface="Courier New" pitchFamily="49" charset="0"/>
+              </a:rPr>
+              <a:t>i </a:t>
+            </a:r>
+            <a:r>
+              <a:rPr lang="de-DE" sz="1800" b="1" dirty="0" smtClean="0">
+                <a:latin typeface="Calibri" pitchFamily="34" charset="0"/>
+              </a:rPr>
+              <a:t>Boden hängt ab von</a:t>
+            </a:r>
+            <a:endParaRPr lang="de-DE" sz="1800" b="1" dirty="0" smtClean="0">
+              <a:latin typeface="Calibri" pitchFamily="34" charset="0"/>
+            </a:endParaRPr>
           </a:p>
         </p:txBody>
       </p:sp>
@@ -16724,8 +16811,8 @@
         </p:nvSpPr>
         <p:spPr>
           <a:xfrm>
-            <a:off x="250824" y="1874728"/>
-            <a:ext cx="4897439" cy="1431161"/>
+            <a:off x="250824" y="2135758"/>
+            <a:ext cx="4897439" cy="723275"/>
           </a:xfrm>
           <a:prstGeom prst="rect">
             <a:avLst/>
@@ -16738,29 +16825,42 @@
           </a:bodyPr>
           <a:lstStyle/>
           <a:p>
-            <a:pPr>
+            <a:pPr marL="174625" indent="-174625">
               <a:spcAft>
                 <a:spcPts val="600"/>
               </a:spcAft>
+              <a:buFont typeface="Wingdings" pitchFamily="2" charset="2"/>
+              <a:buChar char="§"/>
             </a:pPr>
             <a:r>
               <a:rPr lang="de-DE" sz="1800" dirty="0" smtClean="0">
                 <a:latin typeface="Calibri" pitchFamily="34" charset="0"/>
-              </a:rPr>
-              <a:t>Verdunstung findet immer über den Boden statt.</a:t>
-            </a:r>
-          </a:p>
-          <a:p>
-            <a:pPr>
-              <a:spcAft>
-                <a:spcPts val="600"/>
-              </a:spcAft>
-            </a:pPr>
+                <a:cs typeface="Courier New" pitchFamily="49" charset="0"/>
+              </a:rPr>
+              <a:t>der </a:t>
+            </a:r>
             <a:r>
               <a:rPr lang="de-DE" sz="1800" dirty="0" smtClean="0">
                 <a:latin typeface="Calibri" pitchFamily="34" charset="0"/>
-              </a:rPr>
-              <a:t>Die Höhe der Verdunstung hängt ab von </a:t>
+                <a:cs typeface="Courier New" pitchFamily="49" charset="0"/>
+              </a:rPr>
+              <a:t>Potenziellen Verdunstung </a:t>
+            </a:r>
+            <a:r>
+              <a:rPr lang="de-DE" sz="1800" dirty="0" smtClean="0">
+                <a:solidFill>
+                  <a:srgbClr val="3366FF"/>
+                </a:solidFill>
+                <a:latin typeface="Courier New" pitchFamily="49" charset="0"/>
+                <a:cs typeface="Courier New" pitchFamily="49" charset="0"/>
+              </a:rPr>
+              <a:t>PET</a:t>
+            </a:r>
+            <a:r>
+              <a:rPr lang="de-DE" sz="1800" dirty="0" smtClean="0">
+                <a:latin typeface="Calibri" pitchFamily="34" charset="0"/>
+              </a:rPr>
+              <a:t> und </a:t>
             </a:r>
           </a:p>
           <a:p>
@@ -16774,49 +16874,17 @@
             <a:r>
               <a:rPr lang="de-DE" sz="1800" dirty="0" smtClean="0">
                 <a:latin typeface="Calibri" pitchFamily="34" charset="0"/>
-                <a:cs typeface="Courier New" pitchFamily="49" charset="0"/>
-              </a:rPr>
-              <a:t>der Potenziellen Verdunstung </a:t>
+              </a:rPr>
+              <a:t>der Speicherfähigkeit des Bodens (</a:t>
             </a:r>
             <a:r>
               <a:rPr lang="de-DE" sz="1800" dirty="0" smtClean="0">
                 <a:solidFill>
                   <a:srgbClr val="3366FF"/>
                 </a:solidFill>
-                <a:latin typeface="Courier New" pitchFamily="49" charset="0"/>
-                <a:cs typeface="Courier New" pitchFamily="49" charset="0"/>
-              </a:rPr>
-              <a:t>PET</a:t>
-            </a:r>
-            <a:r>
-              <a:rPr lang="de-DE" sz="1800" dirty="0" smtClean="0">
-                <a:latin typeface="Calibri" pitchFamily="34" charset="0"/>
-              </a:rPr>
-              <a:t> und </a:t>
-            </a:r>
-          </a:p>
-          <a:p>
-            <a:pPr marL="174625" indent="-174625">
-              <a:spcAft>
-                <a:spcPts val="600"/>
-              </a:spcAft>
-              <a:buFont typeface="Wingdings" pitchFamily="2" charset="2"/>
-              <a:buChar char="§"/>
-            </a:pPr>
-            <a:r>
-              <a:rPr lang="de-DE" sz="1800" dirty="0" smtClean="0">
-                <a:latin typeface="Calibri" pitchFamily="34" charset="0"/>
-              </a:rPr>
-              <a:t>der relativen Sättigung des Bodens (</a:t>
-            </a:r>
-            <a:r>
-              <a:rPr lang="de-DE" sz="1800" dirty="0" smtClean="0">
-                <a:solidFill>
-                  <a:srgbClr val="3366FF"/>
-                </a:solidFill>
-                <a:latin typeface="Calibri" pitchFamily="34" charset="0"/>
-              </a:rPr>
-              <a:t>S/b</a:t>
+                <a:latin typeface="Calibri" pitchFamily="34" charset="0"/>
+              </a:rPr>
+              <a:t>b</a:t>
             </a:r>
             <a:r>
               <a:rPr lang="de-DE" sz="1800" dirty="0" smtClean="0">
@@ -18193,7 +18261,7 @@
                             </p:stCondLst>
                             <p:childTnLst>
                               <p:par>
-                                <p:cTn id="15" presetID="22" presetClass="entr" presetSubtype="8" fill="hold" grpId="0" nodeType="clickEffect">
+                                <p:cTn id="15" presetID="9" presetClass="entr" presetSubtype="0" fill="hold" grpId="0" nodeType="clickEffect">
                                   <p:stCondLst>
                                     <p:cond delay="0"/>
                                   </p:stCondLst>
@@ -18206,11 +18274,7 @@
                                           </p:stCondLst>
                                         </p:cTn>
                                         <p:tgtEl>
-                                          <p:spTgt spid="63">
-                                            <p:txEl>
-                                              <p:pRg st="1" end="1"/>
-                                            </p:txEl>
-                                          </p:spTgt>
+                                          <p:spTgt spid="78"/>
                                         </p:tgtEl>
                                         <p:attrNameLst>
                                           <p:attrName>style.visibility</p:attrName>
@@ -18220,15 +18284,11 @@
                                         <p:strVal val="visible"/>
                                       </p:to>
                                     </p:set>
-                                    <p:animEffect transition="in" filter="wipe(left)">
+                                    <p:animEffect transition="in" filter="dissolve">
                                       <p:cBhvr>
                                         <p:cTn id="17" dur="500"/>
                                         <p:tgtEl>
-                                          <p:spTgt spid="63">
-                                            <p:txEl>
-                                              <p:pRg st="1" end="1"/>
-                                            </p:txEl>
-                                          </p:spTgt>
+                                          <p:spTgt spid="78"/>
                                         </p:tgtEl>
                                       </p:cBhvr>
                                     </p:animEffect>
@@ -18254,7 +18314,7 @@
                             </p:stCondLst>
                             <p:childTnLst>
                               <p:par>
-                                <p:cTn id="20" presetID="22" presetClass="entr" presetSubtype="8" fill="hold" grpId="0" nodeType="clickEffect">
+                                <p:cTn id="20" presetID="10" presetClass="entr" presetSubtype="0" fill="hold" nodeType="clickEffect">
                                   <p:stCondLst>
                                     <p:cond delay="0"/>
                                   </p:stCondLst>
@@ -18267,11 +18327,7 @@
                                           </p:stCondLst>
                                         </p:cTn>
                                         <p:tgtEl>
-                                          <p:spTgt spid="63">
-                                            <p:txEl>
-                                              <p:pRg st="2" end="2"/>
-                                            </p:txEl>
-                                          </p:spTgt>
+                                          <p:spTgt spid="87"/>
                                         </p:tgtEl>
                                         <p:attrNameLst>
                                           <p:attrName>style.visibility</p:attrName>
@@ -18281,15 +18337,11 @@
                                         <p:strVal val="visible"/>
                                       </p:to>
                                     </p:set>
-                                    <p:animEffect transition="in" filter="wipe(left)">
+                                    <p:animEffect transition="in" filter="fade">
                                       <p:cBhvr>
-                                        <p:cTn id="22" dur="500"/>
+                                        <p:cTn id="22" dur="2000"/>
                                         <p:tgtEl>
-                                          <p:spTgt spid="63">
-                                            <p:txEl>
-                                              <p:pRg st="2" end="2"/>
-                                            </p:txEl>
-                                          </p:spTgt>
+                                          <p:spTgt spid="87"/>
                                         </p:tgtEl>
                                       </p:cBhvr>
                                     </p:animEffect>
@@ -18315,7 +18367,7 @@
                             </p:stCondLst>
                             <p:childTnLst>
                               <p:par>
-                                <p:cTn id="25" presetID="22" presetClass="entr" presetSubtype="8" fill="hold" grpId="0" nodeType="clickEffect">
+                                <p:cTn id="25" presetID="9" presetClass="entr" presetSubtype="0" fill="hold" nodeType="clickEffect">
                                   <p:stCondLst>
                                     <p:cond delay="0"/>
                                   </p:stCondLst>
@@ -18328,11 +18380,7 @@
                                           </p:stCondLst>
                                         </p:cTn>
                                         <p:tgtEl>
-                                          <p:spTgt spid="63">
-                                            <p:txEl>
-                                              <p:pRg st="3" end="3"/>
-                                            </p:txEl>
-                                          </p:spTgt>
+                                          <p:spTgt spid="90117"/>
                                         </p:tgtEl>
                                         <p:attrNameLst>
                                           <p:attrName>style.visibility</p:attrName>
@@ -18342,15 +18390,11 @@
                                         <p:strVal val="visible"/>
                                       </p:to>
                                     </p:set>
-                                    <p:animEffect transition="in" filter="wipe(left)">
+                                    <p:animEffect transition="in" filter="dissolve">
                                       <p:cBhvr>
                                         <p:cTn id="27" dur="500"/>
                                         <p:tgtEl>
-                                          <p:spTgt spid="63">
-                                            <p:txEl>
-                                              <p:pRg st="3" end="3"/>
-                                            </p:txEl>
-                                          </p:spTgt>
+                                          <p:spTgt spid="90117"/>
                                         </p:tgtEl>
                                       </p:cBhvr>
                                     </p:animEffect>
@@ -18389,7 +18433,7 @@
                                           </p:stCondLst>
                                         </p:cTn>
                                         <p:tgtEl>
-                                          <p:spTgt spid="78"/>
+                                          <p:spTgt spid="85"/>
                                         </p:tgtEl>
                                         <p:attrNameLst>
                                           <p:attrName>style.visibility</p:attrName>
@@ -18403,165 +18447,6 @@
                                       <p:cBhvr>
                                         <p:cTn id="32" dur="500"/>
                                         <p:tgtEl>
-                                          <p:spTgt spid="78"/>
-                                        </p:tgtEl>
-                                      </p:cBhvr>
-                                    </p:animEffect>
-                                  </p:childTnLst>
-                                </p:cTn>
-                              </p:par>
-                            </p:childTnLst>
-                          </p:cTn>
-                        </p:par>
-                      </p:childTnLst>
-                    </p:cTn>
-                  </p:par>
-                  <p:par>
-                    <p:cTn id="33" fill="hold">
-                      <p:stCondLst>
-                        <p:cond delay="indefinite"/>
-                      </p:stCondLst>
-                      <p:childTnLst>
-                        <p:par>
-                          <p:cTn id="34" fill="hold">
-                            <p:stCondLst>
-                              <p:cond delay="0"/>
-                            </p:stCondLst>
-                            <p:childTnLst>
-                              <p:par>
-                                <p:cTn id="35" presetID="10" presetClass="entr" presetSubtype="0" fill="hold" nodeType="clickEffect">
-                                  <p:stCondLst>
-                                    <p:cond delay="0"/>
-                                  </p:stCondLst>
-                                  <p:childTnLst>
-                                    <p:set>
-                                      <p:cBhvr>
-                                        <p:cTn id="36" dur="1" fill="hold">
-                                          <p:stCondLst>
-                                            <p:cond delay="0"/>
-                                          </p:stCondLst>
-                                        </p:cTn>
-                                        <p:tgtEl>
-                                          <p:spTgt spid="87"/>
-                                        </p:tgtEl>
-                                        <p:attrNameLst>
-                                          <p:attrName>style.visibility</p:attrName>
-                                        </p:attrNameLst>
-                                      </p:cBhvr>
-                                      <p:to>
-                                        <p:strVal val="visible"/>
-                                      </p:to>
-                                    </p:set>
-                                    <p:animEffect transition="in" filter="fade">
-                                      <p:cBhvr>
-                                        <p:cTn id="37" dur="2000"/>
-                                        <p:tgtEl>
-                                          <p:spTgt spid="87"/>
-                                        </p:tgtEl>
-                                      </p:cBhvr>
-                                    </p:animEffect>
-                                  </p:childTnLst>
-                                </p:cTn>
-                              </p:par>
-                            </p:childTnLst>
-                          </p:cTn>
-                        </p:par>
-                      </p:childTnLst>
-                    </p:cTn>
-                  </p:par>
-                  <p:par>
-                    <p:cTn id="38" fill="hold">
-                      <p:stCondLst>
-                        <p:cond delay="indefinite"/>
-                      </p:stCondLst>
-                      <p:childTnLst>
-                        <p:par>
-                          <p:cTn id="39" fill="hold">
-                            <p:stCondLst>
-                              <p:cond delay="0"/>
-                            </p:stCondLst>
-                            <p:childTnLst>
-                              <p:par>
-                                <p:cTn id="40" presetID="9" presetClass="entr" presetSubtype="0" fill="hold" nodeType="clickEffect">
-                                  <p:stCondLst>
-                                    <p:cond delay="0"/>
-                                  </p:stCondLst>
-                                  <p:childTnLst>
-                                    <p:set>
-                                      <p:cBhvr>
-                                        <p:cTn id="41" dur="1" fill="hold">
-                                          <p:stCondLst>
-                                            <p:cond delay="0"/>
-                                          </p:stCondLst>
-                                        </p:cTn>
-                                        <p:tgtEl>
-                                          <p:spTgt spid="90117"/>
-                                        </p:tgtEl>
-                                        <p:attrNameLst>
-                                          <p:attrName>style.visibility</p:attrName>
-                                        </p:attrNameLst>
-                                      </p:cBhvr>
-                                      <p:to>
-                                        <p:strVal val="visible"/>
-                                      </p:to>
-                                    </p:set>
-                                    <p:animEffect transition="in" filter="dissolve">
-                                      <p:cBhvr>
-                                        <p:cTn id="42" dur="500"/>
-                                        <p:tgtEl>
-                                          <p:spTgt spid="90117"/>
-                                        </p:tgtEl>
-                                      </p:cBhvr>
-                                    </p:animEffect>
-                                  </p:childTnLst>
-                                </p:cTn>
-                              </p:par>
-                            </p:childTnLst>
-                          </p:cTn>
-                        </p:par>
-                      </p:childTnLst>
-                    </p:cTn>
-                  </p:par>
-                  <p:par>
-                    <p:cTn id="43" fill="hold">
-                      <p:stCondLst>
-                        <p:cond delay="indefinite"/>
-                      </p:stCondLst>
-                      <p:childTnLst>
-                        <p:par>
-                          <p:cTn id="44" fill="hold">
-                            <p:stCondLst>
-                              <p:cond delay="0"/>
-                            </p:stCondLst>
-                            <p:childTnLst>
-                              <p:par>
-                                <p:cTn id="45" presetID="9" presetClass="entr" presetSubtype="0" fill="hold" grpId="0" nodeType="clickEffect">
-                                  <p:stCondLst>
-                                    <p:cond delay="0"/>
-                                  </p:stCondLst>
-                                  <p:childTnLst>
-                                    <p:set>
-                                      <p:cBhvr>
-                                        <p:cTn id="46" dur="1" fill="hold">
-                                          <p:stCondLst>
-                                            <p:cond delay="0"/>
-                                          </p:stCondLst>
-                                        </p:cTn>
-                                        <p:tgtEl>
-                                          <p:spTgt spid="85"/>
-                                        </p:tgtEl>
-                                        <p:attrNameLst>
-                                          <p:attrName>style.visibility</p:attrName>
-                                        </p:attrNameLst>
-                                      </p:cBhvr>
-                                      <p:to>
-                                        <p:strVal val="visible"/>
-                                      </p:to>
-                                    </p:set>
-                                    <p:animEffect transition="in" filter="dissolve">
-                                      <p:cBhvr>
-                                        <p:cTn id="47" dur="500"/>
-                                        <p:tgtEl>
                                           <p:spTgt spid="85"/>
                                         </p:tgtEl>
                                       </p:cBhvr>
@@ -18570,14 +18455,14 @@
                                 </p:cTn>
                               </p:par>
                               <p:par>
-                                <p:cTn id="48" presetID="9" presetClass="entr" presetSubtype="0" fill="hold" nodeType="withEffect">
+                                <p:cTn id="33" presetID="9" presetClass="entr" presetSubtype="0" fill="hold" nodeType="withEffect">
                                   <p:stCondLst>
                                     <p:cond delay="0"/>
                                   </p:stCondLst>
                                   <p:childTnLst>
                                     <p:set>
                                       <p:cBhvr>
-                                        <p:cTn id="49" dur="1" fill="hold">
+                                        <p:cTn id="34" dur="1" fill="hold">
                                           <p:stCondLst>
                                             <p:cond delay="0"/>
                                           </p:stCondLst>
@@ -18595,7 +18480,7 @@
                                     </p:set>
                                     <p:animEffect transition="in" filter="dissolve">
                                       <p:cBhvr>
-                                        <p:cTn id="50" dur="500"/>
+                                        <p:cTn id="35" dur="500"/>
                                         <p:tgtEl>
                                           <p:spTgt spid="86"/>
                                         </p:tgtEl>
@@ -18735,45 +18620,6 @@
           </a:p>
         </p:txBody>
       </p:sp>
-      <p:sp>
-        <p:nvSpPr>
-          <p:cNvPr id="61" name="Textfeld 60"/>
-          <p:cNvSpPr txBox="1"/>
-          <p:nvPr/>
-        </p:nvSpPr>
-        <p:spPr>
-          <a:xfrm>
-            <a:off x="250825" y="1484784"/>
-            <a:ext cx="5041255" cy="369332"/>
-          </a:xfrm>
-          <a:prstGeom prst="rect">
-            <a:avLst/>
-          </a:prstGeom>
-          <a:noFill/>
-        </p:spPr>
-        <p:txBody>
-          <a:bodyPr wrap="square" rtlCol="0">
-            <a:spAutoFit/>
-          </a:bodyPr>
-          <a:lstStyle/>
-          <a:p>
-            <a:pPr>
-              <a:spcAft>
-                <a:spcPts val="600"/>
-              </a:spcAft>
-              <a:tabLst>
-                <a:tab pos="534988" algn="l"/>
-              </a:tabLst>
-            </a:pPr>
-            <a:r>
-              <a:rPr lang="de-DE" sz="1800" b="1" dirty="0" smtClean="0">
-                <a:latin typeface="Calibri" pitchFamily="34" charset="0"/>
-              </a:rPr>
-              <a:t>Aufteilung zwischen Verdunstung und Boden</a:t>
-            </a:r>
-          </a:p>
-        </p:txBody>
-      </p:sp>
       <p:graphicFrame>
         <p:nvGraphicFramePr>
           <p:cNvPr id="62" name="Objekt 61"/>
@@ -18794,117 +18640,6 @@
           </a:graphicData>
         </a:graphic>
       </p:graphicFrame>
-      <p:sp>
-        <p:nvSpPr>
-          <p:cNvPr id="63" name="Textfeld 62"/>
-          <p:cNvSpPr txBox="1"/>
-          <p:nvPr/>
-        </p:nvSpPr>
-        <p:spPr>
-          <a:xfrm>
-            <a:off x="250824" y="1874728"/>
-            <a:ext cx="4897439" cy="1431161"/>
-          </a:xfrm>
-          <a:prstGeom prst="rect">
-            <a:avLst/>
-          </a:prstGeom>
-          <a:noFill/>
-        </p:spPr>
-        <p:txBody>
-          <a:bodyPr wrap="square" rtlCol="0">
-            <a:spAutoFit/>
-          </a:bodyPr>
-          <a:lstStyle/>
-          <a:p>
-            <a:pPr>
-              <a:spcAft>
-                <a:spcPts val="600"/>
-              </a:spcAft>
-            </a:pPr>
-            <a:r>
-              <a:rPr lang="de-DE" sz="1800" dirty="0" smtClean="0">
-                <a:latin typeface="Calibri" pitchFamily="34" charset="0"/>
-              </a:rPr>
-              <a:t>Verdunstung findet immer über den Boden statt.</a:t>
-            </a:r>
-          </a:p>
-          <a:p>
-            <a:pPr>
-              <a:spcAft>
-                <a:spcPts val="600"/>
-              </a:spcAft>
-            </a:pPr>
-            <a:r>
-              <a:rPr lang="de-DE" sz="1800" dirty="0" smtClean="0">
-                <a:latin typeface="Calibri" pitchFamily="34" charset="0"/>
-              </a:rPr>
-              <a:t>Die Höhe der Verdunstung hängt ab von </a:t>
-            </a:r>
-          </a:p>
-          <a:p>
-            <a:pPr marL="174625" indent="-174625">
-              <a:spcAft>
-                <a:spcPts val="600"/>
-              </a:spcAft>
-              <a:buFont typeface="Wingdings" pitchFamily="2" charset="2"/>
-              <a:buChar char="§"/>
-            </a:pPr>
-            <a:r>
-              <a:rPr lang="de-DE" sz="1800" dirty="0" smtClean="0">
-                <a:latin typeface="Calibri" pitchFamily="34" charset="0"/>
-                <a:cs typeface="Courier New" pitchFamily="49" charset="0"/>
-              </a:rPr>
-              <a:t>der Potenziellen Verdunstung </a:t>
-            </a:r>
-            <a:r>
-              <a:rPr lang="de-DE" sz="1800" dirty="0" smtClean="0">
-                <a:solidFill>
-                  <a:srgbClr val="3366FF"/>
-                </a:solidFill>
-                <a:latin typeface="Courier New" pitchFamily="49" charset="0"/>
-                <a:cs typeface="Courier New" pitchFamily="49" charset="0"/>
-              </a:rPr>
-              <a:t>PET</a:t>
-            </a:r>
-            <a:r>
-              <a:rPr lang="de-DE" sz="1800" dirty="0" smtClean="0">
-                <a:latin typeface="Calibri" pitchFamily="34" charset="0"/>
-              </a:rPr>
-              <a:t> und </a:t>
-            </a:r>
-          </a:p>
-          <a:p>
-            <a:pPr marL="174625" indent="-174625">
-              <a:spcAft>
-                <a:spcPts val="600"/>
-              </a:spcAft>
-              <a:buFont typeface="Wingdings" pitchFamily="2" charset="2"/>
-              <a:buChar char="§"/>
-            </a:pPr>
-            <a:r>
-              <a:rPr lang="de-DE" sz="1800" dirty="0" smtClean="0">
-                <a:latin typeface="Calibri" pitchFamily="34" charset="0"/>
-              </a:rPr>
-              <a:t>der relativen Sättigung des Bodens (</a:t>
-            </a:r>
-            <a:r>
-              <a:rPr lang="de-DE" sz="1800" dirty="0" smtClean="0">
-                <a:solidFill>
-                  <a:srgbClr val="3366FF"/>
-                </a:solidFill>
-                <a:latin typeface="Calibri" pitchFamily="34" charset="0"/>
-              </a:rPr>
-              <a:t>S/b</a:t>
-            </a:r>
-            <a:r>
-              <a:rPr lang="de-DE" sz="1800" dirty="0" smtClean="0">
-                <a:latin typeface="Calibri" pitchFamily="34" charset="0"/>
-              </a:rPr>
-              <a:t>) </a:t>
-            </a:r>
-          </a:p>
-        </p:txBody>
-      </p:sp>
       <p:graphicFrame>
         <p:nvGraphicFramePr>
           <p:cNvPr id="90115" name="Object 2"/>
@@ -20596,6 +20331,222 @@
           </a:p>
         </p:txBody>
       </p:sp>
+      <p:sp>
+        <p:nvSpPr>
+          <p:cNvPr id="44" name="Textfeld 43"/>
+          <p:cNvSpPr txBox="1"/>
+          <p:nvPr/>
+        </p:nvSpPr>
+        <p:spPr>
+          <a:xfrm>
+            <a:off x="250825" y="1484784"/>
+            <a:ext cx="5041255" cy="646331"/>
+          </a:xfrm>
+          <a:prstGeom prst="rect">
+            <a:avLst/>
+          </a:prstGeom>
+          <a:noFill/>
+        </p:spPr>
+        <p:txBody>
+          <a:bodyPr wrap="square" rtlCol="0">
+            <a:spAutoFit/>
+          </a:bodyPr>
+          <a:lstStyle/>
+          <a:p>
+            <a:pPr>
+              <a:spcAft>
+                <a:spcPts val="600"/>
+              </a:spcAft>
+              <a:tabLst>
+                <a:tab pos="534988" algn="l"/>
+              </a:tabLst>
+            </a:pPr>
+            <a:r>
+              <a:rPr lang="de-DE" sz="1800" b="1" dirty="0" smtClean="0">
+                <a:latin typeface="Calibri" pitchFamily="34" charset="0"/>
+              </a:rPr>
+              <a:t>Aufteilung von </a:t>
+            </a:r>
+            <a:r>
+              <a:rPr lang="de-DE" sz="1800" i="1" dirty="0" smtClean="0">
+                <a:latin typeface="Calibri" pitchFamily="34" charset="0"/>
+              </a:rPr>
+              <a:t>Y</a:t>
+            </a:r>
+            <a:r>
+              <a:rPr lang="de-DE" sz="1800" i="1" baseline="-25000" dirty="0" smtClean="0">
+                <a:latin typeface="Calibri" pitchFamily="34" charset="0"/>
+              </a:rPr>
+              <a:t>i</a:t>
+            </a:r>
+            <a:r>
+              <a:rPr lang="de-DE" sz="1800" b="1" dirty="0" smtClean="0">
+                <a:latin typeface="Calibri" pitchFamily="34" charset="0"/>
+              </a:rPr>
+              <a:t> </a:t>
+            </a:r>
+            <a:r>
+              <a:rPr lang="de-DE" sz="1800" b="1" dirty="0" smtClean="0">
+                <a:latin typeface="Calibri" pitchFamily="34" charset="0"/>
+              </a:rPr>
+              <a:t>zwischen </a:t>
+            </a:r>
+            <a:r>
+              <a:rPr lang="de-DE" sz="1800" b="1" dirty="0" smtClean="0">
+                <a:latin typeface="Calibri" pitchFamily="34" charset="0"/>
+              </a:rPr>
+              <a:t>Verdunstung </a:t>
+            </a:r>
+            <a:r>
+              <a:rPr lang="de-DE" sz="1800" dirty="0" smtClean="0">
+                <a:latin typeface="Calibri" pitchFamily="34" charset="0"/>
+              </a:rPr>
+              <a:t> </a:t>
+            </a:r>
+            <a:r>
+              <a:rPr lang="de-DE" sz="1800" dirty="0" smtClean="0">
+                <a:latin typeface="Courier New" pitchFamily="49" charset="0"/>
+                <a:cs typeface="Courier New" pitchFamily="49" charset="0"/>
+              </a:rPr>
+              <a:t>E</a:t>
+            </a:r>
+            <a:r>
+              <a:rPr lang="de-DE" sz="1800" baseline="-25000" dirty="0" smtClean="0">
+                <a:latin typeface="Courier New" pitchFamily="49" charset="0"/>
+                <a:cs typeface="Courier New" pitchFamily="49" charset="0"/>
+              </a:rPr>
+              <a:t>i</a:t>
+            </a:r>
+            <a:r>
+              <a:rPr lang="de-DE" sz="1800" b="1" dirty="0" smtClean="0">
+                <a:latin typeface="Calibri" pitchFamily="34" charset="0"/>
+              </a:rPr>
+              <a:t> </a:t>
+            </a:r>
+            <a:r>
+              <a:rPr lang="de-DE" sz="1800" b="1" dirty="0" smtClean="0">
+                <a:latin typeface="Calibri" pitchFamily="34" charset="0"/>
+              </a:rPr>
+              <a:t>und </a:t>
+            </a:r>
+            <a:r>
+              <a:rPr lang="de-DE" sz="1800" dirty="0" smtClean="0">
+                <a:latin typeface="Courier New" pitchFamily="49" charset="0"/>
+                <a:cs typeface="Courier New" pitchFamily="49" charset="0"/>
+              </a:rPr>
+              <a:t>S</a:t>
+            </a:r>
+            <a:r>
+              <a:rPr lang="de-DE" sz="1800" baseline="-25000" dirty="0" smtClean="0">
+                <a:latin typeface="Courier New" pitchFamily="49" charset="0"/>
+                <a:cs typeface="Courier New" pitchFamily="49" charset="0"/>
+              </a:rPr>
+              <a:t>i </a:t>
+            </a:r>
+            <a:r>
+              <a:rPr lang="de-DE" sz="1800" b="1" dirty="0" smtClean="0">
+                <a:latin typeface="Calibri" pitchFamily="34" charset="0"/>
+              </a:rPr>
+              <a:t>Boden hängt ab von</a:t>
+            </a:r>
+            <a:endParaRPr lang="de-DE" sz="1800" b="1" dirty="0" smtClean="0">
+              <a:latin typeface="Calibri" pitchFamily="34" charset="0"/>
+            </a:endParaRPr>
+          </a:p>
+        </p:txBody>
+      </p:sp>
+      <p:sp>
+        <p:nvSpPr>
+          <p:cNvPr id="45" name="Textfeld 44"/>
+          <p:cNvSpPr txBox="1"/>
+          <p:nvPr/>
+        </p:nvSpPr>
+        <p:spPr>
+          <a:xfrm>
+            <a:off x="250824" y="2135758"/>
+            <a:ext cx="4897439" cy="723275"/>
+          </a:xfrm>
+          <a:prstGeom prst="rect">
+            <a:avLst/>
+          </a:prstGeom>
+          <a:noFill/>
+        </p:spPr>
+        <p:txBody>
+          <a:bodyPr wrap="square" rtlCol="0">
+            <a:spAutoFit/>
+          </a:bodyPr>
+          <a:lstStyle/>
+          <a:p>
+            <a:pPr marL="174625" indent="-174625">
+              <a:spcAft>
+                <a:spcPts val="600"/>
+              </a:spcAft>
+              <a:buFont typeface="Wingdings" pitchFamily="2" charset="2"/>
+              <a:buChar char="§"/>
+            </a:pPr>
+            <a:r>
+              <a:rPr lang="de-DE" sz="1800" dirty="0" smtClean="0">
+                <a:latin typeface="Calibri" pitchFamily="34" charset="0"/>
+                <a:cs typeface="Courier New" pitchFamily="49" charset="0"/>
+              </a:rPr>
+              <a:t>der </a:t>
+            </a:r>
+            <a:r>
+              <a:rPr lang="de-DE" sz="1800" dirty="0" smtClean="0">
+                <a:latin typeface="Calibri" pitchFamily="34" charset="0"/>
+                <a:cs typeface="Courier New" pitchFamily="49" charset="0"/>
+              </a:rPr>
+              <a:t>Potenziellen Verdunstung </a:t>
+            </a:r>
+            <a:r>
+              <a:rPr lang="de-DE" sz="1800" dirty="0" smtClean="0">
+                <a:solidFill>
+                  <a:srgbClr val="3366FF"/>
+                </a:solidFill>
+                <a:latin typeface="Courier New" pitchFamily="49" charset="0"/>
+                <a:cs typeface="Courier New" pitchFamily="49" charset="0"/>
+              </a:rPr>
+              <a:t>PET</a:t>
+            </a:r>
+            <a:r>
+              <a:rPr lang="de-DE" sz="1800" dirty="0" smtClean="0">
+                <a:latin typeface="Calibri" pitchFamily="34" charset="0"/>
+              </a:rPr>
+              <a:t> und </a:t>
+            </a:r>
+          </a:p>
+          <a:p>
+            <a:pPr marL="174625" indent="-174625">
+              <a:spcAft>
+                <a:spcPts val="600"/>
+              </a:spcAft>
+              <a:buFont typeface="Wingdings" pitchFamily="2" charset="2"/>
+              <a:buChar char="§"/>
+            </a:pPr>
+            <a:r>
+              <a:rPr lang="de-DE" sz="1800" dirty="0" smtClean="0">
+                <a:latin typeface="Calibri" pitchFamily="34" charset="0"/>
+              </a:rPr>
+              <a:t>der Speicherfähigkeit des Bodens (</a:t>
+            </a:r>
+            <a:r>
+              <a:rPr lang="de-DE" sz="1800" dirty="0" smtClean="0">
+                <a:solidFill>
+                  <a:srgbClr val="3366FF"/>
+                </a:solidFill>
+                <a:latin typeface="Calibri" pitchFamily="34" charset="0"/>
+              </a:rPr>
+              <a:t>b</a:t>
+            </a:r>
+            <a:r>
+              <a:rPr lang="de-DE" sz="1800" dirty="0" smtClean="0">
+                <a:latin typeface="Calibri" pitchFamily="34" charset="0"/>
+              </a:rPr>
+              <a:t>) </a:t>
+            </a:r>
+          </a:p>
+        </p:txBody>
+      </p:sp>
     </p:spTree>
   </p:cSld>
   <p:clrMapOvr>
@@ -20745,17 +20696,17 @@
               <a:t>Aufteilung des Überschusses </a:t>
             </a:r>
             <a:r>
-              <a:rPr lang="de-DE" sz="1800" b="1" dirty="0" smtClean="0">
+              <a:rPr lang="de-DE" sz="1800" b="1" dirty="0" err="1" smtClean="0">
                 <a:solidFill>
                   <a:srgbClr val="3366FF"/>
                 </a:solidFill>
                 <a:latin typeface="Courier New" pitchFamily="49" charset="0"/>
                 <a:cs typeface="Courier New" pitchFamily="49" charset="0"/>
               </a:rPr>
-              <a:t>Y</a:t>
-            </a:r>
-            <a:r>
-              <a:rPr lang="de-DE" sz="1800" b="1" baseline="-25000" dirty="0" smtClean="0">
+              <a:t>W</a:t>
+            </a:r>
+            <a:r>
+              <a:rPr lang="de-DE" sz="1800" b="1" baseline="-25000" dirty="0" err="1" smtClean="0">
                 <a:solidFill>
                   <a:srgbClr val="3366FF"/>
                 </a:solidFill>
@@ -20765,27 +20716,27 @@
               <a:t>i</a:t>
             </a:r>
             <a:r>
-              <a:rPr lang="de-DE" sz="1800" b="1" dirty="0" smtClean="0">
+              <a:rPr lang="de-DE" sz="1800" b="1" baseline="-25000" dirty="0" smtClean="0">
                 <a:solidFill>
                   <a:srgbClr val="3366FF"/>
                 </a:solidFill>
                 <a:latin typeface="Courier New" pitchFamily="49" charset="0"/>
                 <a:cs typeface="Courier New" pitchFamily="49" charset="0"/>
               </a:rPr>
-              <a:t> - </a:t>
-            </a:r>
-            <a:r>
-              <a:rPr lang="de-DE" sz="1800" b="1" dirty="0" err="1" smtClean="0">
+              <a:t> </a:t>
+            </a:r>
+            <a:r>
+              <a:rPr lang="de-DE" sz="1800" b="1" dirty="0" smtClean="0">
                 <a:solidFill>
                   <a:srgbClr val="3366FF"/>
                 </a:solidFill>
                 <a:latin typeface="Courier New" pitchFamily="49" charset="0"/>
                 <a:cs typeface="Courier New" pitchFamily="49" charset="0"/>
               </a:rPr>
-              <a:t>W</a:t>
-            </a:r>
-            <a:r>
-              <a:rPr lang="de-DE" sz="1800" b="1" baseline="-25000" dirty="0" err="1" smtClean="0">
+              <a:t>- Y</a:t>
+            </a:r>
+            <a:r>
+              <a:rPr lang="de-DE" sz="1800" b="1" baseline="-25000" dirty="0" smtClean="0">
                 <a:solidFill>
                   <a:srgbClr val="3366FF"/>
                 </a:solidFill>
@@ -20794,12 +20745,9 @@
               </a:rPr>
               <a:t>i</a:t>
             </a:r>
-            <a:r>
-              <a:rPr lang="de-DE" sz="1800" b="1" dirty="0" smtClean="0">
-                <a:latin typeface="Calibri" pitchFamily="34" charset="0"/>
-              </a:rPr>
-              <a:t> </a:t>
-            </a:r>
+            <a:endParaRPr lang="de-DE" sz="1800" b="1" dirty="0" smtClean="0">
+              <a:latin typeface="Calibri" pitchFamily="34" charset="0"/>
+            </a:endParaRPr>
           </a:p>
         </p:txBody>
       </p:sp>
@@ -20837,47 +20785,47 @@
               <a:t>Der Überschuss </a:t>
             </a:r>
             <a:r>
-              <a:rPr lang="de-DE" sz="1800" dirty="0" smtClean="0">
+              <a:rPr lang="de-DE" sz="1800" dirty="0" err="1" smtClean="0">
                 <a:solidFill>
                   <a:srgbClr val="3366FF"/>
                 </a:solidFill>
                 <a:latin typeface="Courier New" pitchFamily="49" charset="0"/>
                 <a:cs typeface="Courier New" pitchFamily="49" charset="0"/>
               </a:rPr>
-              <a:t>Y</a:t>
-            </a:r>
-            <a:r>
-              <a:rPr lang="de-DE" sz="1800" baseline="-25000" dirty="0" smtClean="0">
+              <a:t>W</a:t>
+            </a:r>
+            <a:r>
+              <a:rPr lang="de-DE" sz="1800" baseline="-25000" dirty="0" err="1" smtClean="0">
                 <a:solidFill>
                   <a:srgbClr val="3366FF"/>
                 </a:solidFill>
                 <a:latin typeface="Courier New" pitchFamily="49" charset="0"/>
                 <a:cs typeface="Courier New" pitchFamily="49" charset="0"/>
               </a:rPr>
-              <a:t>i </a:t>
-            </a:r>
-            <a:r>
-              <a:rPr lang="de-DE" sz="1800" dirty="0" smtClean="0">
+              <a:t>i</a:t>
+            </a:r>
+            <a:r>
+              <a:rPr lang="de-DE" sz="1800" baseline="-25000" dirty="0" smtClean="0">
                 <a:solidFill>
                   <a:srgbClr val="3366FF"/>
                 </a:solidFill>
                 <a:latin typeface="Courier New" pitchFamily="49" charset="0"/>
                 <a:cs typeface="Courier New" pitchFamily="49" charset="0"/>
               </a:rPr>
-              <a:t>– </a:t>
-            </a:r>
-            <a:r>
-              <a:rPr lang="de-DE" sz="1800" dirty="0" err="1" smtClean="0">
+              <a:t> </a:t>
+            </a:r>
+            <a:r>
+              <a:rPr lang="de-DE" sz="1800" dirty="0" smtClean="0">
                 <a:solidFill>
                   <a:srgbClr val="3366FF"/>
                 </a:solidFill>
                 <a:latin typeface="Courier New" pitchFamily="49" charset="0"/>
                 <a:cs typeface="Courier New" pitchFamily="49" charset="0"/>
               </a:rPr>
-              <a:t>W</a:t>
-            </a:r>
-            <a:r>
-              <a:rPr lang="de-DE" sz="1800" baseline="-25000" dirty="0" err="1" smtClean="0">
+              <a:t>– Y</a:t>
+            </a:r>
+            <a:r>
+              <a:rPr lang="de-DE" sz="1800" baseline="-25000" dirty="0" smtClean="0">
                 <a:solidFill>
                   <a:srgbClr val="3366FF"/>
                 </a:solidFill>
@@ -20887,7 +20835,7 @@
               <a:t>i</a:t>
             </a:r>
             <a:r>
-              <a:rPr lang="de-DE" sz="1800" dirty="0" smtClean="0">
+              <a:rPr lang="de-DE" sz="1800" b="1" baseline="-25000" dirty="0" smtClean="0">
                 <a:solidFill>
                   <a:srgbClr val="3366FF"/>
                 </a:solidFill>
@@ -20900,7 +20848,13 @@
               <a:rPr lang="de-DE" sz="1800" dirty="0" smtClean="0">
                 <a:latin typeface="Calibri" pitchFamily="34" charset="0"/>
               </a:rPr>
-              <a:t>wird in Direktabfluss </a:t>
+              <a:t>wird </a:t>
+            </a:r>
+            <a:r>
+              <a:rPr lang="de-DE" sz="1800" dirty="0" smtClean="0">
+                <a:latin typeface="Calibri" pitchFamily="34" charset="0"/>
+              </a:rPr>
+              <a:t>in Direktabfluss </a:t>
             </a:r>
             <a:r>
               <a:rPr lang="de-DE" sz="1800" dirty="0" err="1" smtClean="0">
@@ -20982,12 +20936,12 @@
           <p:nvPr/>
         </p:nvGraphicFramePr>
         <p:xfrm>
-          <a:off x="336228" y="2611792"/>
-          <a:ext cx="1728192" cy="311075"/>
+          <a:off x="268288" y="2611438"/>
+          <a:ext cx="1865312" cy="311150"/>
         </p:xfrm>
         <a:graphic>
           <a:graphicData uri="http://schemas.openxmlformats.org/presentationml/2006/ole">
-            <p:oleObj spid="_x0000_s91141" name="Formel" r:id="rId4" imgW="1269720" imgH="228600" progId="Equation.3">
+            <p:oleObj spid="_x0000_s91141" name="Formel" r:id="rId4" imgW="1371600" imgH="228600" progId="Equation.3">
               <p:embed/>
             </p:oleObj>
           </a:graphicData>
@@ -21002,12 +20956,12 @@
           <p:nvPr/>
         </p:nvGraphicFramePr>
         <p:xfrm>
-          <a:off x="336228" y="3043841"/>
-          <a:ext cx="1364742" cy="311354"/>
+          <a:off x="263525" y="3043238"/>
+          <a:ext cx="1741488" cy="312737"/>
         </p:xfrm>
         <a:graphic>
           <a:graphicData uri="http://schemas.openxmlformats.org/presentationml/2006/ole">
-            <p:oleObj spid="_x0000_s91142" name="Formel" r:id="rId5" imgW="1002960" imgH="228600" progId="Equation.3">
+            <p:oleObj spid="_x0000_s91142" name="Formel" r:id="rId5" imgW="1282680" imgH="228600" progId="Equation.3">
               <p:embed/>
             </p:oleObj>
           </a:graphicData>
@@ -24894,7 +24848,7 @@
                   </a:solidFill>
                   <a:latin typeface="Calibri" pitchFamily="34" charset="0"/>
                 </a:rPr>
-                <a:t>Implementieren Sie das </a:t>
+                <a:t>Implementiere das </a:t>
               </a:r>
               <a:r>
                 <a:rPr lang="de-DE" i="1" dirty="0" err="1" smtClean="0">
@@ -27450,6 +27404,136 @@
           </a:p>
         </p:txBody>
       </p:sp>
+      <p:grpSp>
+        <p:nvGrpSpPr>
+          <p:cNvPr id="8" name="Gruppieren 7"/>
+          <p:cNvGrpSpPr/>
+          <p:nvPr/>
+        </p:nvGrpSpPr>
+        <p:grpSpPr>
+          <a:xfrm>
+            <a:off x="179512" y="5589240"/>
+            <a:ext cx="8793686" cy="511579"/>
+            <a:chOff x="278305" y="5589240"/>
+            <a:chExt cx="8793686" cy="511579"/>
+          </a:xfrm>
+        </p:grpSpPr>
+        <p:sp>
+          <p:nvSpPr>
+            <p:cNvPr id="9" name="Text Box 4"/>
+            <p:cNvSpPr txBox="1">
+              <a:spLocks noChangeArrowheads="1"/>
+            </p:cNvSpPr>
+            <p:nvPr/>
+          </p:nvSpPr>
+          <p:spPr bwMode="auto">
+            <a:xfrm>
+              <a:off x="827584" y="5690257"/>
+              <a:ext cx="8244407" cy="369332"/>
+            </a:xfrm>
+            <a:prstGeom prst="rect">
+              <a:avLst/>
+            </a:prstGeom>
+            <a:solidFill>
+              <a:schemeClr val="bg1"/>
+            </a:solidFill>
+            <a:ln w="9525">
+              <a:noFill/>
+              <a:miter lim="800000"/>
+              <a:headEnd/>
+              <a:tailEnd/>
+            </a:ln>
+          </p:spPr>
+          <p:txBody>
+            <a:bodyPr wrap="square">
+              <a:spAutoFit/>
+            </a:bodyPr>
+            <a:lstStyle/>
+            <a:p>
+              <a:pPr>
+                <a:buClr>
+                  <a:schemeClr val="bg2"/>
+                </a:buClr>
+              </a:pPr>
+              <a:r>
+                <a:rPr lang="de-DE" sz="1800" dirty="0" smtClean="0">
+                  <a:solidFill>
+                    <a:schemeClr val="accent5">
+                      <a:lumMod val="50000"/>
+                    </a:schemeClr>
+                  </a:solidFill>
+                  <a:latin typeface="Calibri" pitchFamily="34" charset="0"/>
+                </a:rPr>
+                <a:t>Einlesen und Darstellen einer Beispieldatei mit R (Datei </a:t>
+              </a:r>
+              <a:r>
+                <a:rPr lang="de-DE" dirty="0" err="1" smtClean="0">
+                  <a:solidFill>
+                    <a:schemeClr val="accent5">
+                      <a:lumMod val="50000"/>
+                    </a:schemeClr>
+                  </a:solidFill>
+                  <a:latin typeface="Courier New" pitchFamily="49" charset="0"/>
+                  <a:cs typeface="Courier New" pitchFamily="49" charset="0"/>
+                </a:rPr>
+                <a:t>abcd.R</a:t>
+              </a:r>
+              <a:r>
+                <a:rPr lang="de-DE" sz="1800" dirty="0" smtClean="0">
+                  <a:solidFill>
+                    <a:schemeClr val="accent5">
+                      <a:lumMod val="50000"/>
+                    </a:schemeClr>
+                  </a:solidFill>
+                  <a:latin typeface="Calibri" pitchFamily="34" charset="0"/>
+                </a:rPr>
+                <a:t>).</a:t>
+              </a:r>
+              <a:endParaRPr lang="de-DE" sz="1800" baseline="-25000" dirty="0">
+                <a:solidFill>
+                  <a:schemeClr val="accent5">
+                    <a:lumMod val="50000"/>
+                  </a:schemeClr>
+                </a:solidFill>
+                <a:latin typeface="Calibri" pitchFamily="34" charset="0"/>
+              </a:endParaRPr>
+            </a:p>
+          </p:txBody>
+        </p:sp>
+        <p:pic>
+          <p:nvPicPr>
+            <p:cNvPr id="10" name="Picture 8"/>
+            <p:cNvPicPr>
+              <a:picLocks noChangeAspect="1" noChangeArrowheads="1"/>
+            </p:cNvPicPr>
+            <p:nvPr/>
+          </p:nvPicPr>
+          <p:blipFill>
+            <a:blip r:embed="rId5" cstate="print"/>
+            <a:srcRect/>
+            <a:stretch>
+              <a:fillRect/>
+            </a:stretch>
+          </p:blipFill>
+          <p:spPr bwMode="auto">
+            <a:xfrm>
+              <a:off x="278305" y="5589240"/>
+              <a:ext cx="574997" cy="511579"/>
+            </a:xfrm>
+            <a:prstGeom prst="rect">
+              <a:avLst/>
+            </a:prstGeom>
+            <a:noFill/>
+            <a:ln w="9525">
+              <a:noFill/>
+              <a:miter lim="800000"/>
+              <a:headEnd/>
+              <a:tailEnd/>
+            </a:ln>
+            <a:effectLst/>
+          </p:spPr>
+        </p:pic>
+      </p:grpSp>
     </p:spTree>
   </p:cSld>
   <p:clrMapOvr>
@@ -27510,6 +27594,59 @@
                                         <p:cTn id="7" dur="500"/>
                                         <p:tgtEl>
                                           <p:spTgt spid="36"/>
+                                        </p:tgtEl>
+                                      </p:cBhvr>
+                                    </p:animEffect>
+                                  </p:childTnLst>
+                                </p:cTn>
+                              </p:par>
+                            </p:childTnLst>
+                          </p:cTn>
+                        </p:par>
+                      </p:childTnLst>
+                    </p:cTn>
+                  </p:par>
+                  <p:par>
+                    <p:cTn id="8" fill="hold">
+                      <p:stCondLst>
+                        <p:cond delay="indefinite"/>
+                      </p:stCondLst>
+                      <p:childTnLst>
+                        <p:par>
+                          <p:cTn id="9" fill="hold">
+                            <p:stCondLst>
+                              <p:cond delay="0"/>
+                            </p:stCondLst>
+                            <p:childTnLst>
+                              <p:par>
+                                <p:cTn id="10" presetID="22" presetClass="entr" presetSubtype="8" fill="hold" nodeType="clickEffect">
+                                  <p:stCondLst>
+                                    <p:cond delay="0"/>
+                                  </p:stCondLst>
+                                  <p:childTnLst>
+                                    <p:set>
+                                      <p:cBhvr>
+                                        <p:cTn id="11" dur="1" fill="hold">
+                                          <p:stCondLst>
+                                            <p:cond delay="0"/>
+                                          </p:stCondLst>
+                                        </p:cTn>
+                                        <p:tgtEl>
+                                          <p:spTgt spid="8"/>
+                                        </p:tgtEl>
+                                        <p:attrNameLst>
+                                          <p:attrName>style.visibility</p:attrName>
+                                        </p:attrNameLst>
+                                      </p:cBhvr>
+                                      <p:to>
+                                        <p:strVal val="visible"/>
+                                      </p:to>
+                                    </p:set>
+                                    <p:animEffect transition="in" filter="wipe(left)">
+                                      <p:cBhvr>
+                                        <p:cTn id="12" dur="500"/>
+                                        <p:tgtEl>
+                                          <p:spTgt spid="8"/>
                                         </p:tgtEl>
                                       </p:cBhvr>
                                     </p:animEffect>
@@ -32815,17 +32952,8 @@
               <a:rPr lang="de-DE" sz="2400" dirty="0" smtClean="0">
                 <a:latin typeface="Calibri" pitchFamily="34" charset="0"/>
               </a:rPr>
-              <a:t>Abbildung physikalischer Prozesse (Verdunstung, Schnee</a:t>
-            </a:r>
-            <a:r>
-              <a:rPr lang="de-DE" sz="2400" dirty="0" smtClean="0">
-                <a:latin typeface="Calibri" pitchFamily="34" charset="0"/>
-              </a:rPr>
-              <a:t>)</a:t>
-            </a:r>
-            <a:endParaRPr lang="de-DE" sz="2400" dirty="0" smtClean="0">
-              <a:latin typeface="Calibri" pitchFamily="34" charset="0"/>
-            </a:endParaRPr>
+              <a:t>Abbildung physikalischer Prozesse (Verdunstung, Schnee)</a:t>
+            </a:r>
           </a:p>
         </p:txBody>
       </p:sp>

</xml_diff>